<commit_message>
update notebook and pptx
</commit_message>
<xml_diff>
--- a/lle/LLE.pptx
+++ b/lle/LLE.pptx
@@ -6,7 +6,7 @@
     <p:sldMasterId id="2147483660" r:id="rId5"/>
   </p:sldMasterIdLst>
   <p:notesMasterIdLst>
-    <p:notesMasterId r:id="rId19"/>
+    <p:notesMasterId r:id="rId23"/>
   </p:notesMasterIdLst>
   <p:sldIdLst>
     <p:sldId id="295" r:id="rId6"/>
@@ -18,10 +18,14 @@
     <p:sldId id="300" r:id="rId12"/>
     <p:sldId id="301" r:id="rId13"/>
     <p:sldId id="302" r:id="rId14"/>
-    <p:sldId id="303" r:id="rId15"/>
-    <p:sldId id="304" r:id="rId16"/>
-    <p:sldId id="305" r:id="rId17"/>
-    <p:sldId id="293" r:id="rId18"/>
+    <p:sldId id="308" r:id="rId15"/>
+    <p:sldId id="303" r:id="rId16"/>
+    <p:sldId id="309" r:id="rId17"/>
+    <p:sldId id="310" r:id="rId18"/>
+    <p:sldId id="304" r:id="rId19"/>
+    <p:sldId id="305" r:id="rId20"/>
+    <p:sldId id="311" r:id="rId21"/>
+    <p:sldId id="293" r:id="rId22"/>
   </p:sldIdLst>
   <p:sldSz cx="12192000" cy="6858000"/>
   <p:notesSz cx="6858000" cy="9144000"/>
@@ -137,7 +141,211 @@
       </p:ext>
     </p:extLst>
   </p:cmAuthor>
+  <p:cmAuthor id="2" name="flavio perini" initials="fp" lastIdx="23" clrIdx="1">
+    <p:extLst>
+      <p:ext uri="{19B8F6BF-5375-455C-9EA6-DF929625EA0E}">
+        <p15:presenceInfo xmlns:p15="http://schemas.microsoft.com/office/powerpoint/2012/main" userId="5f914e5d3151611a" providerId="Windows Live"/>
+      </p:ext>
+    </p:extLst>
+  </p:cmAuthor>
 </p:cmAuthorLst>
+</file>
+
+<file path=ppt/comments/comment1.xml><?xml version="1.0" encoding="utf-8"?>
+<p:cmLst xmlns:a="http://schemas.openxmlformats.org/drawingml/2006/main" xmlns:r="http://schemas.openxmlformats.org/officeDocument/2006/relationships" xmlns:p="http://schemas.openxmlformats.org/presentationml/2006/main">
+  <p:cm authorId="2" dt="2021-05-13T09:28:09.180" idx="2">
+    <p:pos x="5188" y="2722"/>
+    <p:text>N_i quindi è una matrice dxk, in quanto ogni punto è d-dimensionale e vengono considerati k vicini</p:text>
+    <p:extLst>
+      <p:ext uri="{C676402C-5697-4E1C-873F-D02D1690AC5C}">
+        <p15:threadingInfo xmlns:p15="http://schemas.microsoft.com/office/powerpoint/2012/main" timeZoneBias="-120"/>
+      </p:ext>
+    </p:extLst>
+  </p:cm>
+</p:cmLst>
+</file>
+
+<file path=ppt/comments/comment2.xml><?xml version="1.0" encoding="utf-8"?>
+<p:cmLst xmlns:a="http://schemas.openxmlformats.org/drawingml/2006/main" xmlns:r="http://schemas.openxmlformats.org/officeDocument/2006/relationships" xmlns:p="http://schemas.openxmlformats.org/presentationml/2006/main">
+  <p:cm authorId="2" dt="2021-05-13T09:23:09.856" idx="1">
+    <p:pos x="4428" y="1651"/>
+    <p:text>Per trovare i pesi, esprimo x_i come somma pesata dei suoi vicini</p:text>
+    <p:extLst>
+      <p:ext uri="{C676402C-5697-4E1C-873F-D02D1690AC5C}">
+        <p15:threadingInfo xmlns:p15="http://schemas.microsoft.com/office/powerpoint/2012/main" timeZoneBias="-120"/>
+      </p:ext>
+    </p:extLst>
+  </p:cm>
+  <p:cm authorId="2" dt="2021-05-13T09:30:44.942" idx="4">
+    <p:pos x="4930" y="2176"/>
+    <p:text>vincolo: la somma dei pesi riferita a ogni punto deve essere pari a 1, così da rendere possibili successive operazioni</p:text>
+    <p:extLst>
+      <p:ext uri="{C676402C-5697-4E1C-873F-D02D1690AC5C}">
+        <p15:threadingInfo xmlns:p15="http://schemas.microsoft.com/office/powerpoint/2012/main" timeZoneBias="-120"/>
+      </p:ext>
+    </p:extLst>
+  </p:cm>
+  <p:cm authorId="2" dt="2021-05-13T09:37:08.820" idx="5">
+    <p:pos x="4642" y="2878"/>
+    <p:text>Ogni punto x_i avrà quindi associato un vettore di k pesi</p:text>
+    <p:extLst>
+      <p:ext uri="{C676402C-5697-4E1C-873F-D02D1690AC5C}">
+        <p15:threadingInfo xmlns:p15="http://schemas.microsoft.com/office/powerpoint/2012/main" timeZoneBias="-120"/>
+      </p:ext>
+    </p:extLst>
+  </p:cm>
+</p:cmLst>
+</file>
+
+<file path=ppt/comments/comment3.xml><?xml version="1.0" encoding="utf-8"?>
+<p:cmLst xmlns:a="http://schemas.openxmlformats.org/drawingml/2006/main" xmlns:r="http://schemas.openxmlformats.org/officeDocument/2006/relationships" xmlns:p="http://schemas.openxmlformats.org/presentationml/2006/main">
+  <p:cm authorId="2" dt="2021-05-13T09:46:22.436" idx="6">
+    <p:pos x="4890" y="1437"/>
+    <p:text>per trovare i pesi corretti, puntiamo a minimizzare l'errore</p:text>
+    <p:extLst>
+      <p:ext uri="{C676402C-5697-4E1C-873F-D02D1690AC5C}">
+        <p15:threadingInfo xmlns:p15="http://schemas.microsoft.com/office/powerpoint/2012/main" timeZoneBias="-120"/>
+      </p:ext>
+    </p:extLst>
+  </p:cm>
+  <p:cm authorId="2" dt="2021-05-13T09:48:21.674" idx="8">
+    <p:pos x="4617" y="2461"/>
+    <p:text>usando Z_i e la sua trasposta, otteniamo la matrice G_i (gram, simmetrica e reale)</p:text>
+    <p:extLst>
+      <p:ext uri="{C676402C-5697-4E1C-873F-D02D1690AC5C}">
+        <p15:threadingInfo xmlns:p15="http://schemas.microsoft.com/office/powerpoint/2012/main" timeZoneBias="-120"/>
+      </p:ext>
+    </p:extLst>
+  </p:cm>
+  <p:cm authorId="2" dt="2021-05-13T09:50:58.937" idx="9">
+    <p:pos x="4377" y="2797"/>
+    <p:text>a questo punto possiamo calcolare il vettore dei pesi riferiti al punto x_i in questo modo (w_i = kx1)</p:text>
+    <p:extLst>
+      <p:ext uri="{C676402C-5697-4E1C-873F-D02D1690AC5C}">
+        <p15:threadingInfo xmlns:p15="http://schemas.microsoft.com/office/powerpoint/2012/main" timeZoneBias="-120"/>
+      </p:ext>
+    </p:extLst>
+  </p:cm>
+</p:cmLst>
+</file>
+
+<file path=ppt/comments/comment4.xml><?xml version="1.0" encoding="utf-8"?>
+<p:cmLst xmlns:a="http://schemas.openxmlformats.org/drawingml/2006/main" xmlns:r="http://schemas.openxmlformats.org/officeDocument/2006/relationships" xmlns:p="http://schemas.openxmlformats.org/presentationml/2006/main">
+  <p:cm authorId="2" dt="2021-05-13T09:53:27.272" idx="11">
+    <p:pos x="5878" y="1126"/>
+    <p:text>non usiamo più input, fissiamo i pesi e cerchiamo y_i</p:text>
+    <p:extLst>
+      <p:ext uri="{C676402C-5697-4E1C-873F-D02D1690AC5C}">
+        <p15:threadingInfo xmlns:p15="http://schemas.microsoft.com/office/powerpoint/2012/main" timeZoneBias="-120"/>
+      </p:ext>
+    </p:extLst>
+  </p:cm>
+  <p:cm authorId="2" dt="2021-05-13T09:54:06.971" idx="12">
+    <p:pos x="4422" y="1629"/>
+    <p:text>così come x_i, vogliamo esprimere y_i come somma pesata dei vicini</p:text>
+    <p:extLst>
+      <p:ext uri="{C676402C-5697-4E1C-873F-D02D1690AC5C}">
+        <p15:threadingInfo xmlns:p15="http://schemas.microsoft.com/office/powerpoint/2012/main" timeZoneBias="-120"/>
+      </p:ext>
+    </p:extLst>
+  </p:cm>
+  <p:cm authorId="2" dt="2021-05-13T09:54:39.337" idx="13">
+    <p:pos x="5283" y="2174"/>
+    <p:text>riga i di W sono i pesi dell'i-esimo punto e la somma della riga è 1</p:text>
+    <p:extLst>
+      <p:ext uri="{C676402C-5697-4E1C-873F-D02D1690AC5C}">
+        <p15:threadingInfo xmlns:p15="http://schemas.microsoft.com/office/powerpoint/2012/main" timeZoneBias="-120"/>
+      </p:ext>
+    </p:extLst>
+  </p:cm>
+  <p:cm authorId="2" dt="2021-05-13T09:56:27.809" idx="14">
+    <p:pos x="4899" y="2880"/>
+    <p:text>La riga i-esima di Y è l'embedding nello spazio ridotto (p)</p:text>
+    <p:extLst>
+      <p:ext uri="{C676402C-5697-4E1C-873F-D02D1690AC5C}">
+        <p15:threadingInfo xmlns:p15="http://schemas.microsoft.com/office/powerpoint/2012/main" timeZoneBias="-120"/>
+      </p:ext>
+    </p:extLst>
+  </p:cm>
+</p:cmLst>
+</file>
+
+<file path=ppt/comments/comment5.xml><?xml version="1.0" encoding="utf-8"?>
+<p:cmLst xmlns:a="http://schemas.openxmlformats.org/drawingml/2006/main" xmlns:r="http://schemas.openxmlformats.org/officeDocument/2006/relationships" xmlns:p="http://schemas.openxmlformats.org/presentationml/2006/main">
+  <p:cm authorId="2" dt="2021-05-13T10:00:56.248" idx="16">
+    <p:pos x="5028" y="1113"/>
+    <p:text>come con i dati in input, vogliamo minimizzare l'errore, detto "reconstruction error", per ottenere Y</p:text>
+    <p:extLst>
+      <p:ext uri="{C676402C-5697-4E1C-873F-D02D1690AC5C}">
+        <p15:threadingInfo xmlns:p15="http://schemas.microsoft.com/office/powerpoint/2012/main" timeZoneBias="-120"/>
+      </p:ext>
+    </p:extLst>
+  </p:cm>
+  <p:cm authorId="2" dt="2021-05-13T10:01:32.641" idx="17">
+    <p:pos x="4404" y="1846"/>
+    <p:text>abbiamo anche in questo caso due vincoli da rispettare, per rendere possibili i passaggi matematici che portano al passaggio successivo</p:text>
+    <p:extLst>
+      <p:ext uri="{C676402C-5697-4E1C-873F-D02D1690AC5C}">
+        <p15:threadingInfo xmlns:p15="http://schemas.microsoft.com/office/powerpoint/2012/main" timeZoneBias="-120"/>
+      </p:ext>
+    </p:extLst>
+  </p:cm>
+  <p:cm authorId="2" dt="2021-05-13T10:02:18.481" idx="18">
+    <p:pos x="5082" y="2830"/>
+    <p:text>la matrice M così ottenuta è nxn, quindi in generale avrà n autovalori</p:text>
+    <p:extLst>
+      <p:ext uri="{C676402C-5697-4E1C-873F-D02D1690AC5C}">
+        <p15:threadingInfo xmlns:p15="http://schemas.microsoft.com/office/powerpoint/2012/main" timeZoneBias="-120"/>
+      </p:ext>
+    </p:extLst>
+  </p:cm>
+</p:cmLst>
+</file>
+
+<file path=ppt/comments/comment6.xml><?xml version="1.0" encoding="utf-8"?>
+<p:cmLst xmlns:a="http://schemas.openxmlformats.org/drawingml/2006/main" xmlns:r="http://schemas.openxmlformats.org/officeDocument/2006/relationships" xmlns:p="http://schemas.openxmlformats.org/presentationml/2006/main">
+  <p:cm authorId="2" dt="2021-05-13T10:55:23.030" idx="20">
+    <p:pos x="5013" y="1065"/>
+    <p:text>calcoliamo autovalori e autovettori della matrice M</p:text>
+    <p:extLst>
+      <p:ext uri="{C676402C-5697-4E1C-873F-D02D1690AC5C}">
+        <p15:threadingInfo xmlns:p15="http://schemas.microsoft.com/office/powerpoint/2012/main" timeZoneBias="-120"/>
+      </p:ext>
+    </p:extLst>
+  </p:cm>
+  <p:cm authorId="2" dt="2021-05-13T10:55:38.367" idx="21">
+    <p:pos x="4590" y="1753"/>
+    <p:text>ordiniamo autovettori in base all'autovalore (ordine crescente, minimizzazione) e scartiamo il 1° (autovalore = 0)</p:text>
+    <p:extLst>
+      <p:ext uri="{C676402C-5697-4E1C-873F-D02D1690AC5C}">
+        <p15:threadingInfo xmlns:p15="http://schemas.microsoft.com/office/powerpoint/2012/main" timeZoneBias="-120"/>
+      </p:ext>
+    </p:extLst>
+  </p:cm>
+  <p:cm authorId="2" dt="2021-05-13T10:57:18.030" idx="22">
+    <p:pos x="4594" y="1918"/>
+    <p:text>le colonne di Y saranno i successivi p autovettori con autovalore non nullo</p:text>
+    <p:extLst>
+      <p:ext uri="{C676402C-5697-4E1C-873F-D02D1690AC5C}">
+        <p15:threadingInfo xmlns:p15="http://schemas.microsoft.com/office/powerpoint/2012/main" timeZoneBias="-120"/>
+      </p:ext>
+    </p:extLst>
+  </p:cm>
+</p:cmLst>
+</file>
+
+<file path=ppt/comments/comment7.xml><?xml version="1.0" encoding="utf-8"?>
+<p:cmLst xmlns:a="http://schemas.openxmlformats.org/drawingml/2006/main" xmlns:r="http://schemas.openxmlformats.org/officeDocument/2006/relationships" xmlns:p="http://schemas.openxmlformats.org/presentationml/2006/main">
+  <p:cm authorId="2" dt="2021-05-13T11:11:45.431" idx="23">
+    <p:pos x="3136" y="1960"/>
+    <p:text>100 immagini dei numeri</p:text>
+    <p:extLst>
+      <p:ext uri="{C676402C-5697-4E1C-873F-D02D1690AC5C}">
+        <p15:threadingInfo xmlns:p15="http://schemas.microsoft.com/office/powerpoint/2012/main" timeZoneBias="-120"/>
+      </p:ext>
+    </p:extLst>
+  </p:cm>
+</p:cmLst>
 </file>
 
 <file path=ppt/notesMasters/notesMaster1.xml><?xml version="1.0" encoding="utf-8"?>
@@ -222,7 +430,7 @@
           <a:p>
             <a:fld id="{AFD01546-198A-4195-BCF8-F0FF54C90E5E}" type="datetimeFigureOut">
               <a:rPr lang="en-US" smtClean="0"/>
-              <a:t>5/12/2021</a:t>
+              <a:t>5/13/2021</a:t>
             </a:fld>
             <a:endParaRPr lang="en-US" dirty="0"/>
           </a:p>
@@ -647,7 +855,7 @@
     </p:spTree>
     <p:extLst>
       <p:ext uri="{BB962C8B-B14F-4D97-AF65-F5344CB8AC3E}">
-        <p14:creationId xmlns:p14="http://schemas.microsoft.com/office/powerpoint/2010/main" val="620076501"/>
+        <p14:creationId xmlns:p14="http://schemas.microsoft.com/office/powerpoint/2010/main" val="3412990872"/>
       </p:ext>
     </p:extLst>
   </p:cSld>
@@ -731,7 +939,343 @@
     </p:spTree>
     <p:extLst>
       <p:ext uri="{BB962C8B-B14F-4D97-AF65-F5344CB8AC3E}">
+        <p14:creationId xmlns:p14="http://schemas.microsoft.com/office/powerpoint/2010/main" val="1877162012"/>
+      </p:ext>
+    </p:extLst>
+  </p:cSld>
+  <p:clrMapOvr>
+    <a:masterClrMapping/>
+  </p:clrMapOvr>
+</p:notes>
+</file>
+
+<file path=ppt/notesSlides/notesSlide12.xml><?xml version="1.0" encoding="utf-8"?>
+<p:notes xmlns:a="http://schemas.openxmlformats.org/drawingml/2006/main" xmlns:r="http://schemas.openxmlformats.org/officeDocument/2006/relationships" xmlns:p="http://schemas.openxmlformats.org/presentationml/2006/main">
+  <p:cSld>
+    <p:spTree>
+      <p:nvGrpSpPr>
+        <p:cNvPr id="1" name=""/>
+        <p:cNvGrpSpPr/>
+        <p:nvPr/>
+      </p:nvGrpSpPr>
+      <p:grpSpPr>
+        <a:xfrm>
+          <a:off x="0" y="0"/>
+          <a:ext cx="0" cy="0"/>
+          <a:chOff x="0" y="0"/>
+          <a:chExt cx="0" cy="0"/>
+        </a:xfrm>
+      </p:grpSpPr>
+      <p:sp>
+        <p:nvSpPr>
+          <p:cNvPr id="2" name="Slide Image Placeholder 1"/>
+          <p:cNvSpPr>
+            <a:spLocks noGrp="1" noRot="1" noChangeAspect="1"/>
+          </p:cNvSpPr>
+          <p:nvPr>
+            <p:ph type="sldImg"/>
+          </p:nvPr>
+        </p:nvSpPr>
+        <p:spPr/>
+      </p:sp>
+      <p:sp>
+        <p:nvSpPr>
+          <p:cNvPr id="3" name="Notes Placeholder 2"/>
+          <p:cNvSpPr>
+            <a:spLocks noGrp="1"/>
+          </p:cNvSpPr>
+          <p:nvPr>
+            <p:ph type="body" idx="1"/>
+          </p:nvPr>
+        </p:nvSpPr>
+        <p:spPr/>
+        <p:txBody>
+          <a:bodyPr/>
+          <a:lstStyle/>
+          <a:p>
+            <a:endParaRPr lang="it-IT" dirty="0"/>
+          </a:p>
+        </p:txBody>
+      </p:sp>
+      <p:sp>
+        <p:nvSpPr>
+          <p:cNvPr id="4" name="Slide Number Placeholder 3"/>
+          <p:cNvSpPr>
+            <a:spLocks noGrp="1"/>
+          </p:cNvSpPr>
+          <p:nvPr>
+            <p:ph type="sldNum" sz="quarter" idx="5"/>
+          </p:nvPr>
+        </p:nvSpPr>
+        <p:spPr/>
+        <p:txBody>
+          <a:bodyPr/>
+          <a:lstStyle/>
+          <a:p>
+            <a:fld id="{2E6DE88F-1F85-4A27-9D34-D74A50E7B0DA}" type="slidenum">
+              <a:rPr lang="en-US" smtClean="0"/>
+              <a:t>13</a:t>
+            </a:fld>
+            <a:endParaRPr lang="en-US" dirty="0"/>
+          </a:p>
+        </p:txBody>
+      </p:sp>
+    </p:spTree>
+    <p:extLst>
+      <p:ext uri="{BB962C8B-B14F-4D97-AF65-F5344CB8AC3E}">
+        <p14:creationId xmlns:p14="http://schemas.microsoft.com/office/powerpoint/2010/main" val="3178364065"/>
+      </p:ext>
+    </p:extLst>
+  </p:cSld>
+  <p:clrMapOvr>
+    <a:masterClrMapping/>
+  </p:clrMapOvr>
+</p:notes>
+</file>
+
+<file path=ppt/notesSlides/notesSlide13.xml><?xml version="1.0" encoding="utf-8"?>
+<p:notes xmlns:a="http://schemas.openxmlformats.org/drawingml/2006/main" xmlns:r="http://schemas.openxmlformats.org/officeDocument/2006/relationships" xmlns:p="http://schemas.openxmlformats.org/presentationml/2006/main">
+  <p:cSld>
+    <p:spTree>
+      <p:nvGrpSpPr>
+        <p:cNvPr id="1" name=""/>
+        <p:cNvGrpSpPr/>
+        <p:nvPr/>
+      </p:nvGrpSpPr>
+      <p:grpSpPr>
+        <a:xfrm>
+          <a:off x="0" y="0"/>
+          <a:ext cx="0" cy="0"/>
+          <a:chOff x="0" y="0"/>
+          <a:chExt cx="0" cy="0"/>
+        </a:xfrm>
+      </p:grpSpPr>
+      <p:sp>
+        <p:nvSpPr>
+          <p:cNvPr id="2" name="Slide Image Placeholder 1"/>
+          <p:cNvSpPr>
+            <a:spLocks noGrp="1" noRot="1" noChangeAspect="1"/>
+          </p:cNvSpPr>
+          <p:nvPr>
+            <p:ph type="sldImg"/>
+          </p:nvPr>
+        </p:nvSpPr>
+        <p:spPr/>
+      </p:sp>
+      <p:sp>
+        <p:nvSpPr>
+          <p:cNvPr id="3" name="Notes Placeholder 2"/>
+          <p:cNvSpPr>
+            <a:spLocks noGrp="1"/>
+          </p:cNvSpPr>
+          <p:nvPr>
+            <p:ph type="body" idx="1"/>
+          </p:nvPr>
+        </p:nvSpPr>
+        <p:spPr/>
+        <p:txBody>
+          <a:bodyPr/>
+          <a:lstStyle/>
+          <a:p>
+            <a:endParaRPr lang="it-IT" dirty="0"/>
+          </a:p>
+        </p:txBody>
+      </p:sp>
+      <p:sp>
+        <p:nvSpPr>
+          <p:cNvPr id="4" name="Slide Number Placeholder 3"/>
+          <p:cNvSpPr>
+            <a:spLocks noGrp="1"/>
+          </p:cNvSpPr>
+          <p:nvPr>
+            <p:ph type="sldNum" sz="quarter" idx="5"/>
+          </p:nvPr>
+        </p:nvSpPr>
+        <p:spPr/>
+        <p:txBody>
+          <a:bodyPr/>
+          <a:lstStyle/>
+          <a:p>
+            <a:fld id="{2E6DE88F-1F85-4A27-9D34-D74A50E7B0DA}" type="slidenum">
+              <a:rPr lang="en-US" smtClean="0"/>
+              <a:t>14</a:t>
+            </a:fld>
+            <a:endParaRPr lang="en-US" dirty="0"/>
+          </a:p>
+        </p:txBody>
+      </p:sp>
+    </p:spTree>
+    <p:extLst>
+      <p:ext uri="{BB962C8B-B14F-4D97-AF65-F5344CB8AC3E}">
+        <p14:creationId xmlns:p14="http://schemas.microsoft.com/office/powerpoint/2010/main" val="620076501"/>
+      </p:ext>
+    </p:extLst>
+  </p:cSld>
+  <p:clrMapOvr>
+    <a:masterClrMapping/>
+  </p:clrMapOvr>
+</p:notes>
+</file>
+
+<file path=ppt/notesSlides/notesSlide14.xml><?xml version="1.0" encoding="utf-8"?>
+<p:notes xmlns:a="http://schemas.openxmlformats.org/drawingml/2006/main" xmlns:r="http://schemas.openxmlformats.org/officeDocument/2006/relationships" xmlns:p="http://schemas.openxmlformats.org/presentationml/2006/main">
+  <p:cSld>
+    <p:spTree>
+      <p:nvGrpSpPr>
+        <p:cNvPr id="1" name=""/>
+        <p:cNvGrpSpPr/>
+        <p:nvPr/>
+      </p:nvGrpSpPr>
+      <p:grpSpPr>
+        <a:xfrm>
+          <a:off x="0" y="0"/>
+          <a:ext cx="0" cy="0"/>
+          <a:chOff x="0" y="0"/>
+          <a:chExt cx="0" cy="0"/>
+        </a:xfrm>
+      </p:grpSpPr>
+      <p:sp>
+        <p:nvSpPr>
+          <p:cNvPr id="2" name="Slide Image Placeholder 1"/>
+          <p:cNvSpPr>
+            <a:spLocks noGrp="1" noRot="1" noChangeAspect="1"/>
+          </p:cNvSpPr>
+          <p:nvPr>
+            <p:ph type="sldImg"/>
+          </p:nvPr>
+        </p:nvSpPr>
+        <p:spPr/>
+      </p:sp>
+      <p:sp>
+        <p:nvSpPr>
+          <p:cNvPr id="3" name="Notes Placeholder 2"/>
+          <p:cNvSpPr>
+            <a:spLocks noGrp="1"/>
+          </p:cNvSpPr>
+          <p:nvPr>
+            <p:ph type="body" idx="1"/>
+          </p:nvPr>
+        </p:nvSpPr>
+        <p:spPr/>
+        <p:txBody>
+          <a:bodyPr/>
+          <a:lstStyle/>
+          <a:p>
+            <a:endParaRPr lang="it-IT" dirty="0"/>
+          </a:p>
+        </p:txBody>
+      </p:sp>
+      <p:sp>
+        <p:nvSpPr>
+          <p:cNvPr id="4" name="Slide Number Placeholder 3"/>
+          <p:cNvSpPr>
+            <a:spLocks noGrp="1"/>
+          </p:cNvSpPr>
+          <p:nvPr>
+            <p:ph type="sldNum" sz="quarter" idx="5"/>
+          </p:nvPr>
+        </p:nvSpPr>
+        <p:spPr/>
+        <p:txBody>
+          <a:bodyPr/>
+          <a:lstStyle/>
+          <a:p>
+            <a:fld id="{2E6DE88F-1F85-4A27-9D34-D74A50E7B0DA}" type="slidenum">
+              <a:rPr lang="en-US" smtClean="0"/>
+              <a:t>15</a:t>
+            </a:fld>
+            <a:endParaRPr lang="en-US" dirty="0"/>
+          </a:p>
+        </p:txBody>
+      </p:sp>
+    </p:spTree>
+    <p:extLst>
+      <p:ext uri="{BB962C8B-B14F-4D97-AF65-F5344CB8AC3E}">
         <p14:creationId xmlns:p14="http://schemas.microsoft.com/office/powerpoint/2010/main" val="1135196639"/>
+      </p:ext>
+    </p:extLst>
+  </p:cSld>
+  <p:clrMapOvr>
+    <a:masterClrMapping/>
+  </p:clrMapOvr>
+</p:notes>
+</file>
+
+<file path=ppt/notesSlides/notesSlide15.xml><?xml version="1.0" encoding="utf-8"?>
+<p:notes xmlns:a="http://schemas.openxmlformats.org/drawingml/2006/main" xmlns:r="http://schemas.openxmlformats.org/officeDocument/2006/relationships" xmlns:p="http://schemas.openxmlformats.org/presentationml/2006/main">
+  <p:cSld>
+    <p:spTree>
+      <p:nvGrpSpPr>
+        <p:cNvPr id="1" name=""/>
+        <p:cNvGrpSpPr/>
+        <p:nvPr/>
+      </p:nvGrpSpPr>
+      <p:grpSpPr>
+        <a:xfrm>
+          <a:off x="0" y="0"/>
+          <a:ext cx="0" cy="0"/>
+          <a:chOff x="0" y="0"/>
+          <a:chExt cx="0" cy="0"/>
+        </a:xfrm>
+      </p:grpSpPr>
+      <p:sp>
+        <p:nvSpPr>
+          <p:cNvPr id="2" name="Slide Image Placeholder 1"/>
+          <p:cNvSpPr>
+            <a:spLocks noGrp="1" noRot="1" noChangeAspect="1"/>
+          </p:cNvSpPr>
+          <p:nvPr>
+            <p:ph type="sldImg"/>
+          </p:nvPr>
+        </p:nvSpPr>
+        <p:spPr/>
+      </p:sp>
+      <p:sp>
+        <p:nvSpPr>
+          <p:cNvPr id="3" name="Notes Placeholder 2"/>
+          <p:cNvSpPr>
+            <a:spLocks noGrp="1"/>
+          </p:cNvSpPr>
+          <p:nvPr>
+            <p:ph type="body" idx="1"/>
+          </p:nvPr>
+        </p:nvSpPr>
+        <p:spPr/>
+        <p:txBody>
+          <a:bodyPr/>
+          <a:lstStyle/>
+          <a:p>
+            <a:endParaRPr lang="it-IT" dirty="0"/>
+          </a:p>
+        </p:txBody>
+      </p:sp>
+      <p:sp>
+        <p:nvSpPr>
+          <p:cNvPr id="4" name="Slide Number Placeholder 3"/>
+          <p:cNvSpPr>
+            <a:spLocks noGrp="1"/>
+          </p:cNvSpPr>
+          <p:nvPr>
+            <p:ph type="sldNum" sz="quarter" idx="5"/>
+          </p:nvPr>
+        </p:nvSpPr>
+        <p:spPr/>
+        <p:txBody>
+          <a:bodyPr/>
+          <a:lstStyle/>
+          <a:p>
+            <a:fld id="{2E6DE88F-1F85-4A27-9D34-D74A50E7B0DA}" type="slidenum">
+              <a:rPr lang="en-US" smtClean="0"/>
+              <a:t>16</a:t>
+            </a:fld>
+            <a:endParaRPr lang="en-US" dirty="0"/>
+          </a:p>
+        </p:txBody>
+      </p:sp>
+    </p:spTree>
+    <p:extLst>
+      <p:ext uri="{BB962C8B-B14F-4D97-AF65-F5344CB8AC3E}">
+        <p14:creationId xmlns:p14="http://schemas.microsoft.com/office/powerpoint/2010/main" val="1215567481"/>
       </p:ext>
     </p:extLst>
   </p:cSld>
@@ -1464,7 +2008,7 @@
     </p:spTree>
     <p:extLst>
       <p:ext uri="{BB962C8B-B14F-4D97-AF65-F5344CB8AC3E}">
-        <p14:creationId xmlns:p14="http://schemas.microsoft.com/office/powerpoint/2010/main" val="3412990872"/>
+        <p14:creationId xmlns:p14="http://schemas.microsoft.com/office/powerpoint/2010/main" val="552539180"/>
       </p:ext>
     </p:extLst>
   </p:cSld>
@@ -1623,7 +2167,7 @@
           <a:p>
             <a:fld id="{60BD2A46-065E-4C6F-842C-064F55942E69}" type="datetime1">
               <a:rPr lang="en-US" smtClean="0"/>
-              <a:t>5/12/2021</a:t>
+              <a:t>5/13/2021</a:t>
             </a:fld>
             <a:endParaRPr lang="en-US" dirty="0"/>
           </a:p>
@@ -1824,7 +2368,7 @@
           <a:p>
             <a:fld id="{2976B3B4-C22F-4487-B68B-929280E59469}" type="datetime1">
               <a:rPr lang="en-US" smtClean="0"/>
-              <a:t>5/12/2021</a:t>
+              <a:t>5/13/2021</a:t>
             </a:fld>
             <a:endParaRPr lang="en-US" dirty="0"/>
           </a:p>
@@ -2034,7 +2578,7 @@
           <a:p>
             <a:fld id="{BF1F001F-F31C-41A9-9088-6D883EAAAAB2}" type="datetime1">
               <a:rPr lang="en-US" smtClean="0"/>
-              <a:t>5/12/2021</a:t>
+              <a:t>5/13/2021</a:t>
             </a:fld>
             <a:endParaRPr lang="en-US" dirty="0"/>
           </a:p>
@@ -2147,7 +2691,7 @@
           <a:p>
             <a:fld id="{75019B29-A095-40CC-8D78-E25CFBAE68BC}" type="datetime1">
               <a:rPr lang="en-US" smtClean="0"/>
-              <a:t>5/12/2021</a:t>
+              <a:t>5/13/2021</a:t>
             </a:fld>
             <a:endParaRPr lang="en-US" dirty="0"/>
           </a:p>
@@ -2411,7 +2955,7 @@
           <a:p>
             <a:fld id="{10195A8C-C7F7-493C-98CE-28C116BE4B4B}" type="datetime1">
               <a:rPr lang="it-IT" smtClean="0"/>
-              <a:t>12/05/2021</a:t>
+              <a:t>13/05/2021</a:t>
             </a:fld>
             <a:endParaRPr lang="it-IT"/>
           </a:p>
@@ -2774,7 +3318,7 @@
           <a:p>
             <a:fld id="{083A22BE-8A6D-467B-9C66-ECAF8AF9BC57}" type="datetime1">
               <a:rPr lang="en-US" smtClean="0"/>
-              <a:t>5/12/2021</a:t>
+              <a:t>5/13/2021</a:t>
             </a:fld>
             <a:endParaRPr lang="en-US" dirty="0"/>
           </a:p>
@@ -3050,7 +3594,7 @@
           <a:p>
             <a:fld id="{41297F15-CACB-42ED-A655-4A51162D3C0A}" type="datetime1">
               <a:rPr lang="en-US" smtClean="0"/>
-              <a:t>5/12/2021</a:t>
+              <a:t>5/13/2021</a:t>
             </a:fld>
             <a:endParaRPr lang="en-US" dirty="0"/>
           </a:p>
@@ -3319,7 +3863,7 @@
           <a:p>
             <a:fld id="{684797E9-3BED-4909-BF1B-A96BCE5DCF86}" type="datetime1">
               <a:rPr lang="en-US" smtClean="0"/>
-              <a:t>5/12/2021</a:t>
+              <a:t>5/13/2021</a:t>
             </a:fld>
             <a:endParaRPr lang="en-US" dirty="0"/>
           </a:p>
@@ -3734,7 +4278,7 @@
           <a:p>
             <a:fld id="{BAAFE497-169B-4AC0-BA05-28709655A9F9}" type="datetime1">
               <a:rPr lang="en-US" smtClean="0"/>
-              <a:t>5/12/2021</a:t>
+              <a:t>5/13/2021</a:t>
             </a:fld>
             <a:endParaRPr lang="en-US" dirty="0"/>
           </a:p>
@@ -3876,7 +4420,7 @@
           <a:p>
             <a:fld id="{1F811A5A-5EA2-4F71-9D52-4432471E1E0C}" type="datetime1">
               <a:rPr lang="en-US" smtClean="0"/>
-              <a:t>5/12/2021</a:t>
+              <a:t>5/13/2021</a:t>
             </a:fld>
             <a:endParaRPr lang="en-US" dirty="0"/>
           </a:p>
@@ -3989,7 +4533,7 @@
           <a:p>
             <a:fld id="{FB8206C2-2FA9-4B87-8C43-5F917DB886D5}" type="datetime1">
               <a:rPr lang="en-US" smtClean="0"/>
-              <a:t>5/12/2021</a:t>
+              <a:t>5/13/2021</a:t>
             </a:fld>
             <a:endParaRPr lang="en-US" dirty="0"/>
           </a:p>
@@ -4302,7 +4846,7 @@
           <a:p>
             <a:fld id="{013C9E0C-DCB7-4A4B-A2E7-7D0DC579EE7B}" type="datetime1">
               <a:rPr lang="en-US" smtClean="0"/>
-              <a:t>5/12/2021</a:t>
+              <a:t>5/13/2021</a:t>
             </a:fld>
             <a:endParaRPr lang="en-US" dirty="0"/>
           </a:p>
@@ -4592,7 +5136,7 @@
           <a:p>
             <a:fld id="{CEB72E66-427D-467D-BA16-D3D140667F77}" type="datetime1">
               <a:rPr lang="en-US" smtClean="0"/>
-              <a:t>5/12/2021</a:t>
+              <a:t>5/13/2021</a:t>
             </a:fld>
             <a:endParaRPr lang="en-US" dirty="0"/>
           </a:p>
@@ -4836,7 +5380,7 @@
           <a:p>
             <a:fld id="{33DFD85C-8750-471F-AD9C-24AEAD6172E6}" type="datetime1">
               <a:rPr lang="en-US" smtClean="0"/>
-              <a:t>5/12/2021</a:t>
+              <a:t>5/13/2021</a:t>
             </a:fld>
             <a:endParaRPr lang="en-US" dirty="0"/>
           </a:p>
@@ -5586,7 +6130,7 @@
           <a:p>
             <a:fld id="{87C63B65-1C5B-474C-AD6B-DA1133078133}" type="datetime1">
               <a:rPr lang="it-IT" smtClean="0"/>
-              <a:t>12/05/2021</a:t>
+              <a:t>13/05/2021</a:t>
             </a:fld>
             <a:endParaRPr lang="it-IT"/>
           </a:p>
@@ -6377,12 +6921,20 @@
           <a:lstStyle/>
           <a:p>
             <a:r>
+              <a:rPr lang="it-IT" dirty="0">
+                <a:solidFill>
+                  <a:srgbClr val="3F568A"/>
+                </a:solidFill>
+              </a:rPr>
+              <a:t>2</a:t>
+            </a:r>
+            <a:r>
               <a:rPr lang="it-IT" sz="4400" dirty="0">
                 <a:solidFill>
                   <a:srgbClr val="3F568A"/>
                 </a:solidFill>
               </a:rPr>
-              <a:t>3: Linear </a:t>
+              <a:t>: Linear </a:t>
             </a:r>
             <a:r>
               <a:rPr lang="it-IT" sz="4400" dirty="0" err="1">
@@ -6390,7 +6942,15 @@
                   <a:srgbClr val="3F568A"/>
                 </a:solidFill>
               </a:rPr>
-              <a:t>Embedding</a:t>
+              <a:t>Reconstruction</a:t>
+            </a:r>
+            <a:r>
+              <a:rPr lang="it-IT" sz="4400" dirty="0">
+                <a:solidFill>
+                  <a:srgbClr val="3F568A"/>
+                </a:solidFill>
+              </a:rPr>
+              <a:t> (2)</a:t>
             </a:r>
             <a:endParaRPr lang="it-IT" dirty="0">
               <a:solidFill>
@@ -6429,18 +6989,6 @@
             <a:pPr marL="0" indent="0">
               <a:buNone/>
             </a:pPr>
-            <a:r>
-              <a:rPr lang="it-IT" sz="2800" dirty="0"/>
-              <a:t>Trovare le coordinate di </a:t>
-            </a:r>
-            <a:r>
-              <a:rPr lang="it-IT" sz="2800" dirty="0" err="1"/>
-              <a:t>dimensionalità</a:t>
-            </a:r>
-            <a:r>
-              <a:rPr lang="it-IT" sz="2800" dirty="0"/>
-              <a:t> ridotta</a:t>
-            </a:r>
             <a:br>
               <a:rPr lang="it-IT" dirty="0"/>
             </a:br>
@@ -6551,10 +7099,10 @@
       </p:pic>
       <p:pic>
         <p:nvPicPr>
-          <p:cNvPr id="10" name="Immagine 9">
-            <a:extLst>
-              <a:ext uri="{FF2B5EF4-FFF2-40B4-BE49-F238E27FC236}">
-                <a16:creationId xmlns:a16="http://schemas.microsoft.com/office/drawing/2014/main" id="{BBC39D22-6EED-4B95-A16B-DDFF63DE973E}"/>
+          <p:cNvPr id="8" name="Immagine 7">
+            <a:extLst>
+              <a:ext uri="{FF2B5EF4-FFF2-40B4-BE49-F238E27FC236}">
+                <a16:creationId xmlns:a16="http://schemas.microsoft.com/office/drawing/2014/main" id="{8893551E-461E-4137-A5A7-E8C22CBBDE3D}"/>
               </a:ext>
             </a:extLst>
           </p:cNvPr>
@@ -6564,15 +7112,26 @@
           <p:nvPr/>
         </p:nvPicPr>
         <p:blipFill>
-          <a:blip r:embed="rId4"/>
+          <a:blip r:embed="rId4">
+            <a:clrChange>
+              <a:clrFrom>
+                <a:srgbClr val="FFFFFF"/>
+              </a:clrFrom>
+              <a:clrTo>
+                <a:srgbClr val="FFFFFF">
+                  <a:alpha val="0"/>
+                </a:srgbClr>
+              </a:clrTo>
+            </a:clrChange>
+          </a:blip>
           <a:stretch>
             <a:fillRect/>
           </a:stretch>
         </p:blipFill>
         <p:spPr>
           <a:xfrm>
-            <a:off x="1319020" y="2833562"/>
-            <a:ext cx="2753109" cy="1276528"/>
+            <a:off x="2814175" y="3375671"/>
+            <a:ext cx="6563641" cy="457264"/>
           </a:xfrm>
           <a:prstGeom prst="rect">
             <a:avLst/>
@@ -6581,10 +7140,10 @@
       </p:pic>
       <p:pic>
         <p:nvPicPr>
-          <p:cNvPr id="13" name="Immagine 12">
-            <a:extLst>
-              <a:ext uri="{FF2B5EF4-FFF2-40B4-BE49-F238E27FC236}">
-                <a16:creationId xmlns:a16="http://schemas.microsoft.com/office/drawing/2014/main" id="{39C08512-06E6-4141-83E9-C7AD8BBBE5DF}"/>
+          <p:cNvPr id="11" name="Immagine 10">
+            <a:extLst>
+              <a:ext uri="{FF2B5EF4-FFF2-40B4-BE49-F238E27FC236}">
+                <a16:creationId xmlns:a16="http://schemas.microsoft.com/office/drawing/2014/main" id="{2218C2EE-AD65-4BB5-AB28-9E0BA083BC77}"/>
               </a:ext>
             </a:extLst>
           </p:cNvPr>
@@ -6594,15 +7153,26 @@
           <p:nvPr/>
         </p:nvPicPr>
         <p:blipFill>
-          <a:blip r:embed="rId5"/>
+          <a:blip r:embed="rId5">
+            <a:clrChange>
+              <a:clrFrom>
+                <a:srgbClr val="FFFFFF"/>
+              </a:clrFrom>
+              <a:clrTo>
+                <a:srgbClr val="FFFFFF">
+                  <a:alpha val="0"/>
+                </a:srgbClr>
+              </a:clrTo>
+            </a:clrChange>
+          </a:blip>
           <a:stretch>
             <a:fillRect/>
           </a:stretch>
         </p:blipFill>
         <p:spPr>
           <a:xfrm>
-            <a:off x="988017" y="3922675"/>
-            <a:ext cx="4801270" cy="1219370"/>
+            <a:off x="4862337" y="3907562"/>
+            <a:ext cx="2467319" cy="457264"/>
           </a:xfrm>
           <a:prstGeom prst="rect">
             <a:avLst/>
@@ -6614,7 +7184,7 @@
           <p:cNvPr id="15" name="Immagine 14">
             <a:extLst>
               <a:ext uri="{FF2B5EF4-FFF2-40B4-BE49-F238E27FC236}">
-                <a16:creationId xmlns:a16="http://schemas.microsoft.com/office/drawing/2014/main" id="{664878D5-3BB1-4425-B2D6-499EFF324AD0}"/>
+                <a16:creationId xmlns:a16="http://schemas.microsoft.com/office/drawing/2014/main" id="{BE60A140-BBC0-4A54-B244-75E027D20D12}"/>
               </a:ext>
             </a:extLst>
           </p:cNvPr>
@@ -6624,15 +7194,434 @@
           <p:nvPr/>
         </p:nvPicPr>
         <p:blipFill>
-          <a:blip r:embed="rId6"/>
+          <a:blip r:embed="rId6">
+            <a:clrChange>
+              <a:clrFrom>
+                <a:srgbClr val="FFFFFF"/>
+              </a:clrFrom>
+              <a:clrTo>
+                <a:srgbClr val="FFFFFF">
+                  <a:alpha val="0"/>
+                </a:srgbClr>
+              </a:clrTo>
+            </a:clrChange>
+          </a:blip>
           <a:stretch>
             <a:fillRect/>
           </a:stretch>
         </p:blipFill>
         <p:spPr>
           <a:xfrm>
-            <a:off x="6096000" y="2747789"/>
-            <a:ext cx="4201111" cy="1962424"/>
+            <a:off x="5243391" y="4439453"/>
+            <a:ext cx="1705213" cy="838317"/>
+          </a:xfrm>
+          <a:prstGeom prst="rect">
+            <a:avLst/>
+          </a:prstGeom>
+        </p:spPr>
+      </p:pic>
+      <p:pic>
+        <p:nvPicPr>
+          <p:cNvPr id="10" name="Immagine 9">
+            <a:extLst>
+              <a:ext uri="{FF2B5EF4-FFF2-40B4-BE49-F238E27FC236}">
+                <a16:creationId xmlns:a16="http://schemas.microsoft.com/office/drawing/2014/main" id="{616ECE68-C78F-4786-B3FD-7ADA1DA31DBC}"/>
+              </a:ext>
+            </a:extLst>
+          </p:cNvPr>
+          <p:cNvPicPr>
+            <a:picLocks noChangeAspect="1"/>
+          </p:cNvPicPr>
+          <p:nvPr/>
+        </p:nvPicPr>
+        <p:blipFill>
+          <a:blip r:embed="rId7">
+            <a:clrChange>
+              <a:clrFrom>
+                <a:srgbClr val="FFFFFF"/>
+              </a:clrFrom>
+              <a:clrTo>
+                <a:srgbClr val="FFFFFF">
+                  <a:alpha val="0"/>
+                </a:srgbClr>
+              </a:clrTo>
+            </a:clrChange>
+          </a:blip>
+          <a:stretch>
+            <a:fillRect/>
+          </a:stretch>
+        </p:blipFill>
+        <p:spPr>
+          <a:xfrm>
+            <a:off x="4428887" y="1867399"/>
+            <a:ext cx="3334215" cy="1057423"/>
+          </a:xfrm>
+          <a:prstGeom prst="rect">
+            <a:avLst/>
+          </a:prstGeom>
+        </p:spPr>
+      </p:pic>
+    </p:spTree>
+    <p:extLst>
+      <p:ext uri="{BB962C8B-B14F-4D97-AF65-F5344CB8AC3E}">
+        <p14:creationId xmlns:p14="http://schemas.microsoft.com/office/powerpoint/2010/main" val="420093635"/>
+      </p:ext>
+    </p:extLst>
+  </p:cSld>
+  <p:clrMapOvr>
+    <a:masterClrMapping/>
+  </p:clrMapOvr>
+</p:sld>
+</file>
+
+<file path=ppt/slides/slide11.xml><?xml version="1.0" encoding="utf-8"?>
+<p:sld xmlns:a="http://schemas.openxmlformats.org/drawingml/2006/main" xmlns:r="http://schemas.openxmlformats.org/officeDocument/2006/relationships" xmlns:p="http://schemas.openxmlformats.org/presentationml/2006/main">
+  <p:cSld>
+    <p:bg>
+      <p:bgPr>
+        <a:solidFill>
+          <a:schemeClr val="bg1">
+            <a:lumMod val="95000"/>
+          </a:schemeClr>
+        </a:solidFill>
+        <a:effectLst/>
+      </p:bgPr>
+    </p:bg>
+    <p:spTree>
+      <p:nvGrpSpPr>
+        <p:cNvPr id="1" name=""/>
+        <p:cNvGrpSpPr/>
+        <p:nvPr/>
+      </p:nvGrpSpPr>
+      <p:grpSpPr>
+        <a:xfrm>
+          <a:off x="0" y="0"/>
+          <a:ext cx="0" cy="0"/>
+          <a:chOff x="0" y="0"/>
+          <a:chExt cx="0" cy="0"/>
+        </a:xfrm>
+      </p:grpSpPr>
+      <p:sp>
+        <p:nvSpPr>
+          <p:cNvPr id="2" name="Title 1">
+            <a:extLst>
+              <a:ext uri="{FF2B5EF4-FFF2-40B4-BE49-F238E27FC236}">
+                <a16:creationId xmlns:a16="http://schemas.microsoft.com/office/drawing/2014/main" id="{DFF15890-FA0B-49AC-B7B6-B1499A3156DC}"/>
+              </a:ext>
+            </a:extLst>
+          </p:cNvPr>
+          <p:cNvSpPr>
+            <a:spLocks noGrp="1"/>
+          </p:cNvSpPr>
+          <p:nvPr>
+            <p:ph type="title"/>
+          </p:nvPr>
+        </p:nvSpPr>
+        <p:spPr/>
+        <p:txBody>
+          <a:bodyPr>
+            <a:normAutofit/>
+          </a:bodyPr>
+          <a:lstStyle/>
+          <a:p>
+            <a:r>
+              <a:rPr lang="it-IT" sz="4400" dirty="0">
+                <a:solidFill>
+                  <a:srgbClr val="3F568A"/>
+                </a:solidFill>
+              </a:rPr>
+              <a:t>3: Linear </a:t>
+            </a:r>
+            <a:r>
+              <a:rPr lang="it-IT" sz="4400" dirty="0" err="1">
+                <a:solidFill>
+                  <a:srgbClr val="3F568A"/>
+                </a:solidFill>
+              </a:rPr>
+              <a:t>Embedding</a:t>
+            </a:r>
+            <a:r>
+              <a:rPr lang="it-IT" sz="4400" dirty="0">
+                <a:solidFill>
+                  <a:srgbClr val="3F568A"/>
+                </a:solidFill>
+              </a:rPr>
+              <a:t> (1)</a:t>
+            </a:r>
+            <a:endParaRPr lang="it-IT" dirty="0">
+              <a:solidFill>
+                <a:srgbClr val="3F568A"/>
+              </a:solidFill>
+            </a:endParaRPr>
+          </a:p>
+        </p:txBody>
+      </p:sp>
+      <p:sp>
+        <p:nvSpPr>
+          <p:cNvPr id="3" name="Content Placeholder 2">
+            <a:extLst>
+              <a:ext uri="{FF2B5EF4-FFF2-40B4-BE49-F238E27FC236}">
+                <a16:creationId xmlns:a16="http://schemas.microsoft.com/office/drawing/2014/main" id="{A82C9650-028C-4EC7-9DF3-02442C3AE5B9}"/>
+              </a:ext>
+            </a:extLst>
+          </p:cNvPr>
+          <p:cNvSpPr>
+            <a:spLocks noGrp="1"/>
+          </p:cNvSpPr>
+          <p:nvPr>
+            <p:ph idx="1"/>
+          </p:nvPr>
+        </p:nvSpPr>
+        <p:spPr>
+          <a:xfrm>
+            <a:off x="838200" y="1690689"/>
+            <a:ext cx="10515600" cy="3955968"/>
+          </a:xfrm>
+        </p:spPr>
+        <p:txBody>
+          <a:bodyPr/>
+          <a:lstStyle/>
+          <a:p>
+            <a:pPr marL="0" indent="0">
+              <a:buNone/>
+            </a:pPr>
+            <a:r>
+              <a:rPr lang="it-IT" sz="2800" dirty="0"/>
+              <a:t>Trovare le coordinate di </a:t>
+            </a:r>
+            <a:r>
+              <a:rPr lang="it-IT" sz="2800" dirty="0" err="1"/>
+              <a:t>dimensionalità</a:t>
+            </a:r>
+            <a:r>
+              <a:rPr lang="it-IT" sz="2800" dirty="0"/>
+              <a:t> ridotta</a:t>
+            </a:r>
+            <a:br>
+              <a:rPr lang="it-IT" dirty="0"/>
+            </a:br>
+            <a:endParaRPr lang="it-IT" dirty="0"/>
+          </a:p>
+          <a:p>
+            <a:endParaRPr lang="it-IT" dirty="0"/>
+          </a:p>
+        </p:txBody>
+      </p:sp>
+      <p:sp>
+        <p:nvSpPr>
+          <p:cNvPr id="4" name="Footer Placeholder 3">
+            <a:extLst>
+              <a:ext uri="{FF2B5EF4-FFF2-40B4-BE49-F238E27FC236}">
+                <a16:creationId xmlns:a16="http://schemas.microsoft.com/office/drawing/2014/main" id="{61934A16-3101-4560-8A56-0B498462C9FB}"/>
+              </a:ext>
+            </a:extLst>
+          </p:cNvPr>
+          <p:cNvSpPr>
+            <a:spLocks noGrp="1"/>
+          </p:cNvSpPr>
+          <p:nvPr>
+            <p:ph type="ftr" sz="quarter" idx="11"/>
+          </p:nvPr>
+        </p:nvSpPr>
+        <p:spPr/>
+        <p:txBody>
+          <a:bodyPr/>
+          <a:lstStyle/>
+          <a:p>
+            <a:endParaRPr lang="en-US" dirty="0"/>
+          </a:p>
+        </p:txBody>
+      </p:sp>
+      <p:pic>
+        <p:nvPicPr>
+          <p:cNvPr id="5" name="Graphic 10">
+            <a:extLst>
+              <a:ext uri="{FF2B5EF4-FFF2-40B4-BE49-F238E27FC236}">
+                <a16:creationId xmlns:a16="http://schemas.microsoft.com/office/drawing/2014/main" id="{FE45D037-93C9-4B4D-B3C3-6189A31DBDD7}"/>
+              </a:ext>
+            </a:extLst>
+          </p:cNvPr>
+          <p:cNvPicPr>
+            <a:picLocks noChangeAspect="1"/>
+          </p:cNvPicPr>
+          <p:nvPr/>
+        </p:nvPicPr>
+        <p:blipFill>
+          <a:blip r:embed="rId3"/>
+          <a:stretch>
+            <a:fillRect/>
+          </a:stretch>
+        </p:blipFill>
+        <p:spPr>
+          <a:xfrm>
+            <a:off x="126000" y="6246000"/>
+            <a:ext cx="1724035" cy="571500"/>
+          </a:xfrm>
+          <a:custGeom>
+            <a:avLst/>
+            <a:gdLst>
+              <a:gd name="connsiteX0" fmla="*/ -89 w 1724035"/>
+              <a:gd name="connsiteY0" fmla="*/ -29 h 571500"/>
+              <a:gd name="connsiteX1" fmla="*/ 1723946 w 1724035"/>
+              <a:gd name="connsiteY1" fmla="*/ -29 h 571500"/>
+              <a:gd name="connsiteX2" fmla="*/ 1723946 w 1724035"/>
+              <a:gd name="connsiteY2" fmla="*/ 571471 h 571500"/>
+              <a:gd name="connsiteX3" fmla="*/ -89 w 1724035"/>
+              <a:gd name="connsiteY3" fmla="*/ 571471 h 571500"/>
+            </a:gdLst>
+            <a:ahLst/>
+            <a:cxnLst>
+              <a:cxn ang="0">
+                <a:pos x="connsiteX0" y="connsiteY0"/>
+              </a:cxn>
+              <a:cxn ang="0">
+                <a:pos x="connsiteX1" y="connsiteY1"/>
+              </a:cxn>
+              <a:cxn ang="0">
+                <a:pos x="connsiteX2" y="connsiteY2"/>
+              </a:cxn>
+              <a:cxn ang="0">
+                <a:pos x="connsiteX3" y="connsiteY3"/>
+              </a:cxn>
+            </a:cxnLst>
+            <a:rect l="l" t="t" r="r" b="b"/>
+            <a:pathLst>
+              <a:path w="1724035" h="571500">
+                <a:moveTo>
+                  <a:pt x="-89" y="-29"/>
+                </a:moveTo>
+                <a:lnTo>
+                  <a:pt x="1723946" y="-29"/>
+                </a:lnTo>
+                <a:lnTo>
+                  <a:pt x="1723946" y="571471"/>
+                </a:lnTo>
+                <a:lnTo>
+                  <a:pt x="-89" y="571471"/>
+                </a:lnTo>
+                <a:close/>
+              </a:path>
+            </a:pathLst>
+          </a:custGeom>
+        </p:spPr>
+      </p:pic>
+      <p:pic>
+        <p:nvPicPr>
+          <p:cNvPr id="7" name="Immagine 6">
+            <a:extLst>
+              <a:ext uri="{FF2B5EF4-FFF2-40B4-BE49-F238E27FC236}">
+                <a16:creationId xmlns:a16="http://schemas.microsoft.com/office/drawing/2014/main" id="{4A1109CE-700D-42A0-BB34-CD25687142AC}"/>
+              </a:ext>
+            </a:extLst>
+          </p:cNvPr>
+          <p:cNvPicPr>
+            <a:picLocks noChangeAspect="1"/>
+          </p:cNvPicPr>
+          <p:nvPr/>
+        </p:nvPicPr>
+        <p:blipFill>
+          <a:blip r:embed="rId4">
+            <a:clrChange>
+              <a:clrFrom>
+                <a:srgbClr val="FFFFFF"/>
+              </a:clrFrom>
+              <a:clrTo>
+                <a:srgbClr val="FFFFFF">
+                  <a:alpha val="0"/>
+                </a:srgbClr>
+              </a:clrTo>
+            </a:clrChange>
+          </a:blip>
+          <a:stretch>
+            <a:fillRect/>
+          </a:stretch>
+        </p:blipFill>
+        <p:spPr>
+          <a:xfrm>
+            <a:off x="5171946" y="2585754"/>
+            <a:ext cx="1848108" cy="724001"/>
+          </a:xfrm>
+          <a:prstGeom prst="rect">
+            <a:avLst/>
+          </a:prstGeom>
+        </p:spPr>
+      </p:pic>
+      <p:pic>
+        <p:nvPicPr>
+          <p:cNvPr id="9" name="Immagine 8">
+            <a:extLst>
+              <a:ext uri="{FF2B5EF4-FFF2-40B4-BE49-F238E27FC236}">
+                <a16:creationId xmlns:a16="http://schemas.microsoft.com/office/drawing/2014/main" id="{989C8EED-B1E8-45F6-9A1B-EC339B5E805A}"/>
+              </a:ext>
+            </a:extLst>
+          </p:cNvPr>
+          <p:cNvPicPr>
+            <a:picLocks noChangeAspect="1"/>
+          </p:cNvPicPr>
+          <p:nvPr/>
+        </p:nvPicPr>
+        <p:blipFill>
+          <a:blip r:embed="rId5">
+            <a:clrChange>
+              <a:clrFrom>
+                <a:srgbClr val="FFFFFF"/>
+              </a:clrFrom>
+              <a:clrTo>
+                <a:srgbClr val="FFFFFF">
+                  <a:alpha val="0"/>
+                </a:srgbClr>
+              </a:clrTo>
+            </a:clrChange>
+          </a:blip>
+          <a:stretch>
+            <a:fillRect/>
+          </a:stretch>
+        </p:blipFill>
+        <p:spPr>
+          <a:xfrm>
+            <a:off x="3804918" y="3451609"/>
+            <a:ext cx="4582164" cy="1076475"/>
+          </a:xfrm>
+          <a:prstGeom prst="rect">
+            <a:avLst/>
+          </a:prstGeom>
+        </p:spPr>
+      </p:pic>
+      <p:pic>
+        <p:nvPicPr>
+          <p:cNvPr id="12" name="Immagine 11">
+            <a:extLst>
+              <a:ext uri="{FF2B5EF4-FFF2-40B4-BE49-F238E27FC236}">
+                <a16:creationId xmlns:a16="http://schemas.microsoft.com/office/drawing/2014/main" id="{75250DB9-71B7-4A3A-B9FD-427BA95D17E9}"/>
+              </a:ext>
+            </a:extLst>
+          </p:cNvPr>
+          <p:cNvPicPr>
+            <a:picLocks noChangeAspect="1"/>
+          </p:cNvPicPr>
+          <p:nvPr/>
+        </p:nvPicPr>
+        <p:blipFill>
+          <a:blip r:embed="rId6">
+            <a:clrChange>
+              <a:clrFrom>
+                <a:srgbClr val="FFFFFF"/>
+              </a:clrFrom>
+              <a:clrTo>
+                <a:srgbClr val="FFFFFF">
+                  <a:alpha val="0"/>
+                </a:srgbClr>
+              </a:clrTo>
+            </a:clrChange>
+          </a:blip>
+          <a:stretch>
+            <a:fillRect/>
+          </a:stretch>
+        </p:blipFill>
+        <p:spPr>
+          <a:xfrm>
+            <a:off x="4414603" y="4571223"/>
+            <a:ext cx="3362794" cy="571580"/>
           </a:xfrm>
           <a:prstGeom prst="rect">
             <a:avLst/>
@@ -6652,7 +7641,676 @@
 </p:sld>
 </file>
 
-<file path=ppt/slides/slide11.xml><?xml version="1.0" encoding="utf-8"?>
+<file path=ppt/slides/slide12.xml><?xml version="1.0" encoding="utf-8"?>
+<p:sld xmlns:a="http://schemas.openxmlformats.org/drawingml/2006/main" xmlns:r="http://schemas.openxmlformats.org/officeDocument/2006/relationships" xmlns:p="http://schemas.openxmlformats.org/presentationml/2006/main">
+  <p:cSld>
+    <p:bg>
+      <p:bgPr>
+        <a:solidFill>
+          <a:schemeClr val="bg1">
+            <a:lumMod val="95000"/>
+          </a:schemeClr>
+        </a:solidFill>
+        <a:effectLst/>
+      </p:bgPr>
+    </p:bg>
+    <p:spTree>
+      <p:nvGrpSpPr>
+        <p:cNvPr id="1" name=""/>
+        <p:cNvGrpSpPr/>
+        <p:nvPr/>
+      </p:nvGrpSpPr>
+      <p:grpSpPr>
+        <a:xfrm>
+          <a:off x="0" y="0"/>
+          <a:ext cx="0" cy="0"/>
+          <a:chOff x="0" y="0"/>
+          <a:chExt cx="0" cy="0"/>
+        </a:xfrm>
+      </p:grpSpPr>
+      <p:sp>
+        <p:nvSpPr>
+          <p:cNvPr id="2" name="Title 1">
+            <a:extLst>
+              <a:ext uri="{FF2B5EF4-FFF2-40B4-BE49-F238E27FC236}">
+                <a16:creationId xmlns:a16="http://schemas.microsoft.com/office/drawing/2014/main" id="{DFF15890-FA0B-49AC-B7B6-B1499A3156DC}"/>
+              </a:ext>
+            </a:extLst>
+          </p:cNvPr>
+          <p:cNvSpPr>
+            <a:spLocks noGrp="1"/>
+          </p:cNvSpPr>
+          <p:nvPr>
+            <p:ph type="title"/>
+          </p:nvPr>
+        </p:nvSpPr>
+        <p:spPr/>
+        <p:txBody>
+          <a:bodyPr>
+            <a:normAutofit/>
+          </a:bodyPr>
+          <a:lstStyle/>
+          <a:p>
+            <a:r>
+              <a:rPr lang="it-IT" sz="4400" dirty="0">
+                <a:solidFill>
+                  <a:srgbClr val="3F568A"/>
+                </a:solidFill>
+              </a:rPr>
+              <a:t>3: Linear </a:t>
+            </a:r>
+            <a:r>
+              <a:rPr lang="it-IT" sz="4400" dirty="0" err="1">
+                <a:solidFill>
+                  <a:srgbClr val="3F568A"/>
+                </a:solidFill>
+              </a:rPr>
+              <a:t>Embedding</a:t>
+            </a:r>
+            <a:r>
+              <a:rPr lang="it-IT" sz="4400" dirty="0">
+                <a:solidFill>
+                  <a:srgbClr val="3F568A"/>
+                </a:solidFill>
+              </a:rPr>
+              <a:t> (2)</a:t>
+            </a:r>
+            <a:endParaRPr lang="it-IT" dirty="0">
+              <a:solidFill>
+                <a:srgbClr val="3F568A"/>
+              </a:solidFill>
+            </a:endParaRPr>
+          </a:p>
+        </p:txBody>
+      </p:sp>
+      <p:sp>
+        <p:nvSpPr>
+          <p:cNvPr id="3" name="Content Placeholder 2">
+            <a:extLst>
+              <a:ext uri="{FF2B5EF4-FFF2-40B4-BE49-F238E27FC236}">
+                <a16:creationId xmlns:a16="http://schemas.microsoft.com/office/drawing/2014/main" id="{A82C9650-028C-4EC7-9DF3-02442C3AE5B9}"/>
+              </a:ext>
+            </a:extLst>
+          </p:cNvPr>
+          <p:cNvSpPr>
+            <a:spLocks noGrp="1"/>
+          </p:cNvSpPr>
+          <p:nvPr>
+            <p:ph idx="1"/>
+          </p:nvPr>
+        </p:nvSpPr>
+        <p:spPr>
+          <a:xfrm>
+            <a:off x="838200" y="1690689"/>
+            <a:ext cx="10515600" cy="3955968"/>
+          </a:xfrm>
+        </p:spPr>
+        <p:txBody>
+          <a:bodyPr/>
+          <a:lstStyle/>
+          <a:p>
+            <a:pPr marL="0" indent="0">
+              <a:buNone/>
+            </a:pPr>
+            <a:br>
+              <a:rPr lang="it-IT" dirty="0"/>
+            </a:br>
+            <a:endParaRPr lang="it-IT" dirty="0"/>
+          </a:p>
+          <a:p>
+            <a:endParaRPr lang="it-IT" dirty="0"/>
+          </a:p>
+        </p:txBody>
+      </p:sp>
+      <p:sp>
+        <p:nvSpPr>
+          <p:cNvPr id="4" name="Footer Placeholder 3">
+            <a:extLst>
+              <a:ext uri="{FF2B5EF4-FFF2-40B4-BE49-F238E27FC236}">
+                <a16:creationId xmlns:a16="http://schemas.microsoft.com/office/drawing/2014/main" id="{61934A16-3101-4560-8A56-0B498462C9FB}"/>
+              </a:ext>
+            </a:extLst>
+          </p:cNvPr>
+          <p:cNvSpPr>
+            <a:spLocks noGrp="1"/>
+          </p:cNvSpPr>
+          <p:nvPr>
+            <p:ph type="ftr" sz="quarter" idx="11"/>
+          </p:nvPr>
+        </p:nvSpPr>
+        <p:spPr/>
+        <p:txBody>
+          <a:bodyPr/>
+          <a:lstStyle/>
+          <a:p>
+            <a:endParaRPr lang="en-US" dirty="0"/>
+          </a:p>
+        </p:txBody>
+      </p:sp>
+      <p:pic>
+        <p:nvPicPr>
+          <p:cNvPr id="5" name="Graphic 10">
+            <a:extLst>
+              <a:ext uri="{FF2B5EF4-FFF2-40B4-BE49-F238E27FC236}">
+                <a16:creationId xmlns:a16="http://schemas.microsoft.com/office/drawing/2014/main" id="{FE45D037-93C9-4B4D-B3C3-6189A31DBDD7}"/>
+              </a:ext>
+            </a:extLst>
+          </p:cNvPr>
+          <p:cNvPicPr>
+            <a:picLocks noChangeAspect="1"/>
+          </p:cNvPicPr>
+          <p:nvPr/>
+        </p:nvPicPr>
+        <p:blipFill>
+          <a:blip r:embed="rId3"/>
+          <a:stretch>
+            <a:fillRect/>
+          </a:stretch>
+        </p:blipFill>
+        <p:spPr>
+          <a:xfrm>
+            <a:off x="126000" y="6246000"/>
+            <a:ext cx="1724035" cy="571500"/>
+          </a:xfrm>
+          <a:custGeom>
+            <a:avLst/>
+            <a:gdLst>
+              <a:gd name="connsiteX0" fmla="*/ -89 w 1724035"/>
+              <a:gd name="connsiteY0" fmla="*/ -29 h 571500"/>
+              <a:gd name="connsiteX1" fmla="*/ 1723946 w 1724035"/>
+              <a:gd name="connsiteY1" fmla="*/ -29 h 571500"/>
+              <a:gd name="connsiteX2" fmla="*/ 1723946 w 1724035"/>
+              <a:gd name="connsiteY2" fmla="*/ 571471 h 571500"/>
+              <a:gd name="connsiteX3" fmla="*/ -89 w 1724035"/>
+              <a:gd name="connsiteY3" fmla="*/ 571471 h 571500"/>
+            </a:gdLst>
+            <a:ahLst/>
+            <a:cxnLst>
+              <a:cxn ang="0">
+                <a:pos x="connsiteX0" y="connsiteY0"/>
+              </a:cxn>
+              <a:cxn ang="0">
+                <a:pos x="connsiteX1" y="connsiteY1"/>
+              </a:cxn>
+              <a:cxn ang="0">
+                <a:pos x="connsiteX2" y="connsiteY2"/>
+              </a:cxn>
+              <a:cxn ang="0">
+                <a:pos x="connsiteX3" y="connsiteY3"/>
+              </a:cxn>
+            </a:cxnLst>
+            <a:rect l="l" t="t" r="r" b="b"/>
+            <a:pathLst>
+              <a:path w="1724035" h="571500">
+                <a:moveTo>
+                  <a:pt x="-89" y="-29"/>
+                </a:moveTo>
+                <a:lnTo>
+                  <a:pt x="1723946" y="-29"/>
+                </a:lnTo>
+                <a:lnTo>
+                  <a:pt x="1723946" y="571471"/>
+                </a:lnTo>
+                <a:lnTo>
+                  <a:pt x="-89" y="571471"/>
+                </a:lnTo>
+                <a:close/>
+              </a:path>
+            </a:pathLst>
+          </a:custGeom>
+        </p:spPr>
+      </p:pic>
+      <p:pic>
+        <p:nvPicPr>
+          <p:cNvPr id="14" name="Immagine 13">
+            <a:extLst>
+              <a:ext uri="{FF2B5EF4-FFF2-40B4-BE49-F238E27FC236}">
+                <a16:creationId xmlns:a16="http://schemas.microsoft.com/office/drawing/2014/main" id="{4F96C573-64EC-44B3-99F3-E91D9BD555C0}"/>
+              </a:ext>
+            </a:extLst>
+          </p:cNvPr>
+          <p:cNvPicPr>
+            <a:picLocks noChangeAspect="1"/>
+          </p:cNvPicPr>
+          <p:nvPr/>
+        </p:nvPicPr>
+        <p:blipFill>
+          <a:blip r:embed="rId4">
+            <a:clrChange>
+              <a:clrFrom>
+                <a:srgbClr val="FFFFFF"/>
+              </a:clrFrom>
+              <a:clrTo>
+                <a:srgbClr val="FFFFFF">
+                  <a:alpha val="0"/>
+                </a:srgbClr>
+              </a:clrTo>
+            </a:clrChange>
+          </a:blip>
+          <a:stretch>
+            <a:fillRect/>
+          </a:stretch>
+        </p:blipFill>
+        <p:spPr>
+          <a:xfrm>
+            <a:off x="5200525" y="2930382"/>
+            <a:ext cx="1790950" cy="1476581"/>
+          </a:xfrm>
+          <a:prstGeom prst="rect">
+            <a:avLst/>
+          </a:prstGeom>
+        </p:spPr>
+      </p:pic>
+      <p:pic>
+        <p:nvPicPr>
+          <p:cNvPr id="7" name="Immagine 6">
+            <a:extLst>
+              <a:ext uri="{FF2B5EF4-FFF2-40B4-BE49-F238E27FC236}">
+                <a16:creationId xmlns:a16="http://schemas.microsoft.com/office/drawing/2014/main" id="{E2B6916B-2752-4AC6-A0D3-A57FCFE9D768}"/>
+              </a:ext>
+            </a:extLst>
+          </p:cNvPr>
+          <p:cNvPicPr>
+            <a:picLocks noChangeAspect="1"/>
+          </p:cNvPicPr>
+          <p:nvPr/>
+        </p:nvPicPr>
+        <p:blipFill>
+          <a:blip r:embed="rId5">
+            <a:clrChange>
+              <a:clrFrom>
+                <a:srgbClr val="FFFFFF"/>
+              </a:clrFrom>
+              <a:clrTo>
+                <a:srgbClr val="FFFFFF">
+                  <a:alpha val="0"/>
+                </a:srgbClr>
+              </a:clrTo>
+            </a:clrChange>
+          </a:blip>
+          <a:stretch>
+            <a:fillRect/>
+          </a:stretch>
+        </p:blipFill>
+        <p:spPr>
+          <a:xfrm>
+            <a:off x="4209787" y="1767535"/>
+            <a:ext cx="3772426" cy="1086002"/>
+          </a:xfrm>
+          <a:prstGeom prst="rect">
+            <a:avLst/>
+          </a:prstGeom>
+        </p:spPr>
+      </p:pic>
+      <p:pic>
+        <p:nvPicPr>
+          <p:cNvPr id="10" name="Immagine 9">
+            <a:extLst>
+              <a:ext uri="{FF2B5EF4-FFF2-40B4-BE49-F238E27FC236}">
+                <a16:creationId xmlns:a16="http://schemas.microsoft.com/office/drawing/2014/main" id="{2C6BC5AC-339D-4A05-9C5D-23BEC820C363}"/>
+              </a:ext>
+            </a:extLst>
+          </p:cNvPr>
+          <p:cNvPicPr>
+            <a:picLocks noChangeAspect="1"/>
+          </p:cNvPicPr>
+          <p:nvPr/>
+        </p:nvPicPr>
+        <p:blipFill>
+          <a:blip r:embed="rId6">
+            <a:clrChange>
+              <a:clrFrom>
+                <a:srgbClr val="FFFFFF"/>
+              </a:clrFrom>
+              <a:clrTo>
+                <a:srgbClr val="FFFFFF">
+                  <a:alpha val="0"/>
+                </a:srgbClr>
+              </a:clrTo>
+            </a:clrChange>
+          </a:blip>
+          <a:stretch>
+            <a:fillRect/>
+          </a:stretch>
+        </p:blipFill>
+        <p:spPr>
+          <a:xfrm>
+            <a:off x="4257418" y="4483808"/>
+            <a:ext cx="3677163" cy="533474"/>
+          </a:xfrm>
+          <a:prstGeom prst="rect">
+            <a:avLst/>
+          </a:prstGeom>
+        </p:spPr>
+      </p:pic>
+    </p:spTree>
+    <p:extLst>
+      <p:ext uri="{BB962C8B-B14F-4D97-AF65-F5344CB8AC3E}">
+        <p14:creationId xmlns:p14="http://schemas.microsoft.com/office/powerpoint/2010/main" val="2121624776"/>
+      </p:ext>
+    </p:extLst>
+  </p:cSld>
+  <p:clrMapOvr>
+    <a:masterClrMapping/>
+  </p:clrMapOvr>
+</p:sld>
+</file>
+
+<file path=ppt/slides/slide13.xml><?xml version="1.0" encoding="utf-8"?>
+<p:sld xmlns:a="http://schemas.openxmlformats.org/drawingml/2006/main" xmlns:r="http://schemas.openxmlformats.org/officeDocument/2006/relationships" xmlns:p="http://schemas.openxmlformats.org/presentationml/2006/main">
+  <p:cSld>
+    <p:bg>
+      <p:bgPr>
+        <a:solidFill>
+          <a:schemeClr val="bg1">
+            <a:lumMod val="95000"/>
+          </a:schemeClr>
+        </a:solidFill>
+        <a:effectLst/>
+      </p:bgPr>
+    </p:bg>
+    <p:spTree>
+      <p:nvGrpSpPr>
+        <p:cNvPr id="1" name=""/>
+        <p:cNvGrpSpPr/>
+        <p:nvPr/>
+      </p:nvGrpSpPr>
+      <p:grpSpPr>
+        <a:xfrm>
+          <a:off x="0" y="0"/>
+          <a:ext cx="0" cy="0"/>
+          <a:chOff x="0" y="0"/>
+          <a:chExt cx="0" cy="0"/>
+        </a:xfrm>
+      </p:grpSpPr>
+      <p:sp>
+        <p:nvSpPr>
+          <p:cNvPr id="2" name="Title 1">
+            <a:extLst>
+              <a:ext uri="{FF2B5EF4-FFF2-40B4-BE49-F238E27FC236}">
+                <a16:creationId xmlns:a16="http://schemas.microsoft.com/office/drawing/2014/main" id="{DFF15890-FA0B-49AC-B7B6-B1499A3156DC}"/>
+              </a:ext>
+            </a:extLst>
+          </p:cNvPr>
+          <p:cNvSpPr>
+            <a:spLocks noGrp="1"/>
+          </p:cNvSpPr>
+          <p:nvPr>
+            <p:ph type="title"/>
+          </p:nvPr>
+        </p:nvSpPr>
+        <p:spPr/>
+        <p:txBody>
+          <a:bodyPr>
+            <a:normAutofit/>
+          </a:bodyPr>
+          <a:lstStyle/>
+          <a:p>
+            <a:r>
+              <a:rPr lang="it-IT" sz="4400" dirty="0">
+                <a:solidFill>
+                  <a:srgbClr val="3F568A"/>
+                </a:solidFill>
+              </a:rPr>
+              <a:t>3: Linear </a:t>
+            </a:r>
+            <a:r>
+              <a:rPr lang="it-IT" sz="4400" dirty="0" err="1">
+                <a:solidFill>
+                  <a:srgbClr val="3F568A"/>
+                </a:solidFill>
+              </a:rPr>
+              <a:t>Embedding</a:t>
+            </a:r>
+            <a:r>
+              <a:rPr lang="it-IT" sz="4400" dirty="0">
+                <a:solidFill>
+                  <a:srgbClr val="3F568A"/>
+                </a:solidFill>
+              </a:rPr>
+              <a:t> (3)</a:t>
+            </a:r>
+            <a:endParaRPr lang="it-IT" dirty="0">
+              <a:solidFill>
+                <a:srgbClr val="3F568A"/>
+              </a:solidFill>
+            </a:endParaRPr>
+          </a:p>
+        </p:txBody>
+      </p:sp>
+      <p:sp>
+        <p:nvSpPr>
+          <p:cNvPr id="3" name="Content Placeholder 2">
+            <a:extLst>
+              <a:ext uri="{FF2B5EF4-FFF2-40B4-BE49-F238E27FC236}">
+                <a16:creationId xmlns:a16="http://schemas.microsoft.com/office/drawing/2014/main" id="{A82C9650-028C-4EC7-9DF3-02442C3AE5B9}"/>
+              </a:ext>
+            </a:extLst>
+          </p:cNvPr>
+          <p:cNvSpPr>
+            <a:spLocks noGrp="1"/>
+          </p:cNvSpPr>
+          <p:nvPr>
+            <p:ph idx="1"/>
+          </p:nvPr>
+        </p:nvSpPr>
+        <p:spPr>
+          <a:xfrm>
+            <a:off x="838200" y="1690689"/>
+            <a:ext cx="10515600" cy="3955968"/>
+          </a:xfrm>
+        </p:spPr>
+        <p:txBody>
+          <a:bodyPr/>
+          <a:lstStyle/>
+          <a:p>
+            <a:pPr marL="0" indent="0">
+              <a:buNone/>
+            </a:pPr>
+            <a:br>
+              <a:rPr lang="it-IT" dirty="0"/>
+            </a:br>
+            <a:endParaRPr lang="it-IT" dirty="0"/>
+          </a:p>
+          <a:p>
+            <a:endParaRPr lang="it-IT" dirty="0"/>
+          </a:p>
+        </p:txBody>
+      </p:sp>
+      <p:sp>
+        <p:nvSpPr>
+          <p:cNvPr id="4" name="Footer Placeholder 3">
+            <a:extLst>
+              <a:ext uri="{FF2B5EF4-FFF2-40B4-BE49-F238E27FC236}">
+                <a16:creationId xmlns:a16="http://schemas.microsoft.com/office/drawing/2014/main" id="{61934A16-3101-4560-8A56-0B498462C9FB}"/>
+              </a:ext>
+            </a:extLst>
+          </p:cNvPr>
+          <p:cNvSpPr>
+            <a:spLocks noGrp="1"/>
+          </p:cNvSpPr>
+          <p:nvPr>
+            <p:ph type="ftr" sz="quarter" idx="11"/>
+          </p:nvPr>
+        </p:nvSpPr>
+        <p:spPr/>
+        <p:txBody>
+          <a:bodyPr/>
+          <a:lstStyle/>
+          <a:p>
+            <a:endParaRPr lang="en-US" dirty="0"/>
+          </a:p>
+        </p:txBody>
+      </p:sp>
+      <p:pic>
+        <p:nvPicPr>
+          <p:cNvPr id="5" name="Graphic 10">
+            <a:extLst>
+              <a:ext uri="{FF2B5EF4-FFF2-40B4-BE49-F238E27FC236}">
+                <a16:creationId xmlns:a16="http://schemas.microsoft.com/office/drawing/2014/main" id="{FE45D037-93C9-4B4D-B3C3-6189A31DBDD7}"/>
+              </a:ext>
+            </a:extLst>
+          </p:cNvPr>
+          <p:cNvPicPr>
+            <a:picLocks noChangeAspect="1"/>
+          </p:cNvPicPr>
+          <p:nvPr/>
+        </p:nvPicPr>
+        <p:blipFill>
+          <a:blip r:embed="rId3"/>
+          <a:stretch>
+            <a:fillRect/>
+          </a:stretch>
+        </p:blipFill>
+        <p:spPr>
+          <a:xfrm>
+            <a:off x="126000" y="6246000"/>
+            <a:ext cx="1724035" cy="571500"/>
+          </a:xfrm>
+          <a:custGeom>
+            <a:avLst/>
+            <a:gdLst>
+              <a:gd name="connsiteX0" fmla="*/ -89 w 1724035"/>
+              <a:gd name="connsiteY0" fmla="*/ -29 h 571500"/>
+              <a:gd name="connsiteX1" fmla="*/ 1723946 w 1724035"/>
+              <a:gd name="connsiteY1" fmla="*/ -29 h 571500"/>
+              <a:gd name="connsiteX2" fmla="*/ 1723946 w 1724035"/>
+              <a:gd name="connsiteY2" fmla="*/ 571471 h 571500"/>
+              <a:gd name="connsiteX3" fmla="*/ -89 w 1724035"/>
+              <a:gd name="connsiteY3" fmla="*/ 571471 h 571500"/>
+            </a:gdLst>
+            <a:ahLst/>
+            <a:cxnLst>
+              <a:cxn ang="0">
+                <a:pos x="connsiteX0" y="connsiteY0"/>
+              </a:cxn>
+              <a:cxn ang="0">
+                <a:pos x="connsiteX1" y="connsiteY1"/>
+              </a:cxn>
+              <a:cxn ang="0">
+                <a:pos x="connsiteX2" y="connsiteY2"/>
+              </a:cxn>
+              <a:cxn ang="0">
+                <a:pos x="connsiteX3" y="connsiteY3"/>
+              </a:cxn>
+            </a:cxnLst>
+            <a:rect l="l" t="t" r="r" b="b"/>
+            <a:pathLst>
+              <a:path w="1724035" h="571500">
+                <a:moveTo>
+                  <a:pt x="-89" y="-29"/>
+                </a:moveTo>
+                <a:lnTo>
+                  <a:pt x="1723946" y="-29"/>
+                </a:lnTo>
+                <a:lnTo>
+                  <a:pt x="1723946" y="571471"/>
+                </a:lnTo>
+                <a:lnTo>
+                  <a:pt x="-89" y="571471"/>
+                </a:lnTo>
+                <a:close/>
+              </a:path>
+            </a:pathLst>
+          </a:custGeom>
+        </p:spPr>
+      </p:pic>
+      <p:pic>
+        <p:nvPicPr>
+          <p:cNvPr id="12" name="Immagine 11">
+            <a:extLst>
+              <a:ext uri="{FF2B5EF4-FFF2-40B4-BE49-F238E27FC236}">
+                <a16:creationId xmlns:a16="http://schemas.microsoft.com/office/drawing/2014/main" id="{DA63B97F-56D1-4664-9805-345529A4502A}"/>
+              </a:ext>
+            </a:extLst>
+          </p:cNvPr>
+          <p:cNvPicPr>
+            <a:picLocks noChangeAspect="1"/>
+          </p:cNvPicPr>
+          <p:nvPr/>
+        </p:nvPicPr>
+        <p:blipFill>
+          <a:blip r:embed="rId4">
+            <a:clrChange>
+              <a:clrFrom>
+                <a:srgbClr val="FFFFFF"/>
+              </a:clrFrom>
+              <a:clrTo>
+                <a:srgbClr val="FFFFFF">
+                  <a:alpha val="0"/>
+                </a:srgbClr>
+              </a:clrTo>
+            </a:clrChange>
+          </a:blip>
+          <a:stretch>
+            <a:fillRect/>
+          </a:stretch>
+        </p:blipFill>
+        <p:spPr>
+          <a:xfrm>
+            <a:off x="4233602" y="1690688"/>
+            <a:ext cx="3724795" cy="562053"/>
+          </a:xfrm>
+          <a:prstGeom prst="rect">
+            <a:avLst/>
+          </a:prstGeom>
+        </p:spPr>
+      </p:pic>
+      <p:pic>
+        <p:nvPicPr>
+          <p:cNvPr id="8" name="Immagine 7">
+            <a:extLst>
+              <a:ext uri="{FF2B5EF4-FFF2-40B4-BE49-F238E27FC236}">
+                <a16:creationId xmlns:a16="http://schemas.microsoft.com/office/drawing/2014/main" id="{9730EBBA-1845-4EEB-A2F7-87F8DF5C3993}"/>
+              </a:ext>
+            </a:extLst>
+          </p:cNvPr>
+          <p:cNvPicPr>
+            <a:picLocks noChangeAspect="1"/>
+          </p:cNvPicPr>
+          <p:nvPr/>
+        </p:nvPicPr>
+        <p:blipFill>
+          <a:blip r:embed="rId5">
+            <a:clrChange>
+              <a:clrFrom>
+                <a:srgbClr val="FFFFFF"/>
+              </a:clrFrom>
+              <a:clrTo>
+                <a:srgbClr val="FFFFFF">
+                  <a:alpha val="0"/>
+                </a:srgbClr>
+              </a:clrTo>
+            </a:clrChange>
+          </a:blip>
+          <a:stretch>
+            <a:fillRect/>
+          </a:stretch>
+        </p:blipFill>
+        <p:spPr>
+          <a:xfrm>
+            <a:off x="4905208" y="2783048"/>
+            <a:ext cx="2381582" cy="647790"/>
+          </a:xfrm>
+          <a:prstGeom prst="rect">
+            <a:avLst/>
+          </a:prstGeom>
+        </p:spPr>
+      </p:pic>
+    </p:spTree>
+    <p:extLst>
+      <p:ext uri="{BB962C8B-B14F-4D97-AF65-F5344CB8AC3E}">
+        <p14:creationId xmlns:p14="http://schemas.microsoft.com/office/powerpoint/2010/main" val="1513485373"/>
+      </p:ext>
+    </p:extLst>
+  </p:cSld>
+  <p:clrMapOvr>
+    <a:masterClrMapping/>
+  </p:clrMapOvr>
+</p:sld>
+</file>
+
+<file path=ppt/slides/slide14.xml><?xml version="1.0" encoding="utf-8"?>
 <p:sld xmlns:a="http://schemas.openxmlformats.org/drawingml/2006/main" xmlns:r="http://schemas.openxmlformats.org/officeDocument/2006/relationships" xmlns:p="http://schemas.openxmlformats.org/presentationml/2006/main">
   <p:cSld>
     <p:bg>
@@ -6900,7 +8558,7 @@
 </p:sld>
 </file>
 
-<file path=ppt/slides/slide12.xml><?xml version="1.0" encoding="utf-8"?>
+<file path=ppt/slides/slide15.xml><?xml version="1.0" encoding="utf-8"?>
 <p:sld xmlns:a="http://schemas.openxmlformats.org/drawingml/2006/main" xmlns:r="http://schemas.openxmlformats.org/officeDocument/2006/relationships" xmlns:p="http://schemas.openxmlformats.org/presentationml/2006/main">
   <p:cSld>
     <p:bg>
@@ -7100,10 +8758,10 @@
       </p:pic>
       <p:pic>
         <p:nvPicPr>
-          <p:cNvPr id="7" name="Immagine 6">
-            <a:extLst>
-              <a:ext uri="{FF2B5EF4-FFF2-40B4-BE49-F238E27FC236}">
-                <a16:creationId xmlns:a16="http://schemas.microsoft.com/office/drawing/2014/main" id="{22427D51-9885-483C-8FD0-16F1E8093C32}"/>
+          <p:cNvPr id="20" name="Immagine 19">
+            <a:extLst>
+              <a:ext uri="{FF2B5EF4-FFF2-40B4-BE49-F238E27FC236}">
+                <a16:creationId xmlns:a16="http://schemas.microsoft.com/office/drawing/2014/main" id="{C900542B-AC1E-4ED4-9BBD-64D58FC58406}"/>
               </a:ext>
             </a:extLst>
           </p:cNvPr>
@@ -7113,15 +8771,26 @@
           <p:nvPr/>
         </p:nvPicPr>
         <p:blipFill>
-          <a:blip r:embed="rId4"/>
+          <a:blip r:embed="rId4">
+            <a:clrChange>
+              <a:clrFrom>
+                <a:srgbClr val="FFFFFF"/>
+              </a:clrFrom>
+              <a:clrTo>
+                <a:srgbClr val="FFFFFF">
+                  <a:alpha val="0"/>
+                </a:srgbClr>
+              </a:clrTo>
+            </a:clrChange>
+          </a:blip>
           <a:stretch>
             <a:fillRect/>
           </a:stretch>
         </p:blipFill>
         <p:spPr>
           <a:xfrm>
-            <a:off x="2599837" y="2141537"/>
-            <a:ext cx="6992326" cy="3057952"/>
+            <a:off x="3690602" y="1463000"/>
+            <a:ext cx="4810796" cy="4553585"/>
           </a:xfrm>
           <a:prstGeom prst="rect">
             <a:avLst/>
@@ -7141,7 +8810,226 @@
 </p:sld>
 </file>
 
-<file path=ppt/slides/slide13.xml><?xml version="1.0" encoding="utf-8"?>
+<file path=ppt/slides/slide16.xml><?xml version="1.0" encoding="utf-8"?>
+<p:sld xmlns:a="http://schemas.openxmlformats.org/drawingml/2006/main" xmlns:r="http://schemas.openxmlformats.org/officeDocument/2006/relationships" xmlns:p="http://schemas.openxmlformats.org/presentationml/2006/main">
+  <p:cSld>
+    <p:bg>
+      <p:bgPr>
+        <a:solidFill>
+          <a:schemeClr val="bg1">
+            <a:lumMod val="95000"/>
+          </a:schemeClr>
+        </a:solidFill>
+        <a:effectLst/>
+      </p:bgPr>
+    </p:bg>
+    <p:spTree>
+      <p:nvGrpSpPr>
+        <p:cNvPr id="1" name=""/>
+        <p:cNvGrpSpPr/>
+        <p:nvPr/>
+      </p:nvGrpSpPr>
+      <p:grpSpPr>
+        <a:xfrm>
+          <a:off x="0" y="0"/>
+          <a:ext cx="0" cy="0"/>
+          <a:chOff x="0" y="0"/>
+          <a:chExt cx="0" cy="0"/>
+        </a:xfrm>
+      </p:grpSpPr>
+      <p:sp>
+        <p:nvSpPr>
+          <p:cNvPr id="2" name="Title 1">
+            <a:extLst>
+              <a:ext uri="{FF2B5EF4-FFF2-40B4-BE49-F238E27FC236}">
+                <a16:creationId xmlns:a16="http://schemas.microsoft.com/office/drawing/2014/main" id="{DFF15890-FA0B-49AC-B7B6-B1499A3156DC}"/>
+              </a:ext>
+            </a:extLst>
+          </p:cNvPr>
+          <p:cNvSpPr>
+            <a:spLocks noGrp="1"/>
+          </p:cNvSpPr>
+          <p:nvPr>
+            <p:ph type="title"/>
+          </p:nvPr>
+        </p:nvSpPr>
+        <p:spPr/>
+        <p:txBody>
+          <a:bodyPr>
+            <a:normAutofit/>
+          </a:bodyPr>
+          <a:lstStyle/>
+          <a:p>
+            <a:r>
+              <a:rPr lang="it-IT" dirty="0" err="1">
+                <a:solidFill>
+                  <a:srgbClr val="3F568A"/>
+                </a:solidFill>
+              </a:rPr>
+              <a:t>Digits</a:t>
+            </a:r>
+            <a:r>
+              <a:rPr lang="it-IT" dirty="0">
+                <a:solidFill>
+                  <a:srgbClr val="3F568A"/>
+                </a:solidFill>
+              </a:rPr>
+              <a:t> dataset</a:t>
+            </a:r>
+          </a:p>
+        </p:txBody>
+      </p:sp>
+      <p:sp>
+        <p:nvSpPr>
+          <p:cNvPr id="3" name="Content Placeholder 2">
+            <a:extLst>
+              <a:ext uri="{FF2B5EF4-FFF2-40B4-BE49-F238E27FC236}">
+                <a16:creationId xmlns:a16="http://schemas.microsoft.com/office/drawing/2014/main" id="{A82C9650-028C-4EC7-9DF3-02442C3AE5B9}"/>
+              </a:ext>
+            </a:extLst>
+          </p:cNvPr>
+          <p:cNvSpPr>
+            <a:spLocks noGrp="1"/>
+          </p:cNvSpPr>
+          <p:nvPr>
+            <p:ph idx="1"/>
+          </p:nvPr>
+        </p:nvSpPr>
+        <p:spPr>
+          <a:xfrm>
+            <a:off x="838200" y="2141537"/>
+            <a:ext cx="10515600" cy="3505119"/>
+          </a:xfrm>
+        </p:spPr>
+        <p:txBody>
+          <a:bodyPr/>
+          <a:lstStyle/>
+          <a:p>
+            <a:pPr marL="0" indent="0">
+              <a:buNone/>
+            </a:pPr>
+            <a:br>
+              <a:rPr lang="it-IT" dirty="0"/>
+            </a:br>
+            <a:endParaRPr lang="it-IT" dirty="0"/>
+          </a:p>
+          <a:p>
+            <a:endParaRPr lang="it-IT" dirty="0"/>
+          </a:p>
+        </p:txBody>
+      </p:sp>
+      <p:sp>
+        <p:nvSpPr>
+          <p:cNvPr id="4" name="Footer Placeholder 3">
+            <a:extLst>
+              <a:ext uri="{FF2B5EF4-FFF2-40B4-BE49-F238E27FC236}">
+                <a16:creationId xmlns:a16="http://schemas.microsoft.com/office/drawing/2014/main" id="{61934A16-3101-4560-8A56-0B498462C9FB}"/>
+              </a:ext>
+            </a:extLst>
+          </p:cNvPr>
+          <p:cNvSpPr>
+            <a:spLocks noGrp="1"/>
+          </p:cNvSpPr>
+          <p:nvPr>
+            <p:ph type="ftr" sz="quarter" idx="11"/>
+          </p:nvPr>
+        </p:nvSpPr>
+        <p:spPr/>
+        <p:txBody>
+          <a:bodyPr/>
+          <a:lstStyle/>
+          <a:p>
+            <a:endParaRPr lang="en-US" dirty="0"/>
+          </a:p>
+        </p:txBody>
+      </p:sp>
+      <p:pic>
+        <p:nvPicPr>
+          <p:cNvPr id="5" name="Graphic 10">
+            <a:extLst>
+              <a:ext uri="{FF2B5EF4-FFF2-40B4-BE49-F238E27FC236}">
+                <a16:creationId xmlns:a16="http://schemas.microsoft.com/office/drawing/2014/main" id="{FE45D037-93C9-4B4D-B3C3-6189A31DBDD7}"/>
+              </a:ext>
+            </a:extLst>
+          </p:cNvPr>
+          <p:cNvPicPr>
+            <a:picLocks noChangeAspect="1"/>
+          </p:cNvPicPr>
+          <p:nvPr/>
+        </p:nvPicPr>
+        <p:blipFill>
+          <a:blip r:embed="rId3"/>
+          <a:stretch>
+            <a:fillRect/>
+          </a:stretch>
+        </p:blipFill>
+        <p:spPr>
+          <a:xfrm>
+            <a:off x="126000" y="6246000"/>
+            <a:ext cx="1724035" cy="571500"/>
+          </a:xfrm>
+          <a:custGeom>
+            <a:avLst/>
+            <a:gdLst>
+              <a:gd name="connsiteX0" fmla="*/ -89 w 1724035"/>
+              <a:gd name="connsiteY0" fmla="*/ -29 h 571500"/>
+              <a:gd name="connsiteX1" fmla="*/ 1723946 w 1724035"/>
+              <a:gd name="connsiteY1" fmla="*/ -29 h 571500"/>
+              <a:gd name="connsiteX2" fmla="*/ 1723946 w 1724035"/>
+              <a:gd name="connsiteY2" fmla="*/ 571471 h 571500"/>
+              <a:gd name="connsiteX3" fmla="*/ -89 w 1724035"/>
+              <a:gd name="connsiteY3" fmla="*/ 571471 h 571500"/>
+            </a:gdLst>
+            <a:ahLst/>
+            <a:cxnLst>
+              <a:cxn ang="0">
+                <a:pos x="connsiteX0" y="connsiteY0"/>
+              </a:cxn>
+              <a:cxn ang="0">
+                <a:pos x="connsiteX1" y="connsiteY1"/>
+              </a:cxn>
+              <a:cxn ang="0">
+                <a:pos x="connsiteX2" y="connsiteY2"/>
+              </a:cxn>
+              <a:cxn ang="0">
+                <a:pos x="connsiteX3" y="connsiteY3"/>
+              </a:cxn>
+            </a:cxnLst>
+            <a:rect l="l" t="t" r="r" b="b"/>
+            <a:pathLst>
+              <a:path w="1724035" h="571500">
+                <a:moveTo>
+                  <a:pt x="-89" y="-29"/>
+                </a:moveTo>
+                <a:lnTo>
+                  <a:pt x="1723946" y="-29"/>
+                </a:lnTo>
+                <a:lnTo>
+                  <a:pt x="1723946" y="571471"/>
+                </a:lnTo>
+                <a:lnTo>
+                  <a:pt x="-89" y="571471"/>
+                </a:lnTo>
+                <a:close/>
+              </a:path>
+            </a:pathLst>
+          </a:custGeom>
+        </p:spPr>
+      </p:pic>
+    </p:spTree>
+    <p:extLst>
+      <p:ext uri="{BB962C8B-B14F-4D97-AF65-F5344CB8AC3E}">
+        <p14:creationId xmlns:p14="http://schemas.microsoft.com/office/powerpoint/2010/main" val="721418226"/>
+      </p:ext>
+    </p:extLst>
+  </p:cSld>
+  <p:clrMapOvr>
+    <a:masterClrMapping/>
+  </p:clrMapOvr>
+</p:sld>
+</file>
+
+<file path=ppt/slides/slide17.xml><?xml version="1.0" encoding="utf-8"?>
 <p:sld xmlns:a="http://schemas.openxmlformats.org/drawingml/2006/main" xmlns:r="http://schemas.openxmlformats.org/officeDocument/2006/relationships" xmlns:p="http://schemas.openxmlformats.org/presentationml/2006/main">
   <p:cSld>
     <p:bg>
@@ -8234,7 +10122,18 @@
           <p:nvPr/>
         </p:nvPicPr>
         <p:blipFill>
-          <a:blip r:embed="rId3"/>
+          <a:blip r:embed="rId3">
+            <a:clrChange>
+              <a:clrFrom>
+                <a:srgbClr val="FFFFFF"/>
+              </a:clrFrom>
+              <a:clrTo>
+                <a:srgbClr val="FFFFFF">
+                  <a:alpha val="0"/>
+                </a:srgbClr>
+              </a:clrTo>
+            </a:clrChange>
+          </a:blip>
           <a:srcRect/>
           <a:stretch/>
         </p:blipFill>
@@ -9136,10 +11035,10 @@
       </p:pic>
       <p:pic>
         <p:nvPicPr>
-          <p:cNvPr id="16" name="Immagine 15">
-            <a:extLst>
-              <a:ext uri="{FF2B5EF4-FFF2-40B4-BE49-F238E27FC236}">
-                <a16:creationId xmlns:a16="http://schemas.microsoft.com/office/drawing/2014/main" id="{E79D19D1-E488-476B-9E5A-8FBBE545D40B}"/>
+          <p:cNvPr id="7" name="Immagine 6">
+            <a:extLst>
+              <a:ext uri="{FF2B5EF4-FFF2-40B4-BE49-F238E27FC236}">
+                <a16:creationId xmlns:a16="http://schemas.microsoft.com/office/drawing/2014/main" id="{7FD43DA2-DF5E-469F-A6A6-5A59EC79FC9B}"/>
               </a:ext>
             </a:extLst>
           </p:cNvPr>
@@ -9149,15 +11048,26 @@
           <p:nvPr/>
         </p:nvPicPr>
         <p:blipFill>
-          <a:blip r:embed="rId4"/>
+          <a:blip r:embed="rId4">
+            <a:clrChange>
+              <a:clrFrom>
+                <a:srgbClr val="FFFFFF"/>
+              </a:clrFrom>
+              <a:clrTo>
+                <a:srgbClr val="FFFFFF">
+                  <a:alpha val="0"/>
+                </a:srgbClr>
+              </a:clrTo>
+            </a:clrChange>
+          </a:blip>
           <a:stretch>
             <a:fillRect/>
           </a:stretch>
         </p:blipFill>
         <p:spPr>
           <a:xfrm>
-            <a:off x="3581049" y="2178049"/>
-            <a:ext cx="5029902" cy="3419952"/>
+            <a:off x="3804918" y="1823813"/>
+            <a:ext cx="4582164" cy="3210373"/>
           </a:xfrm>
           <a:prstGeom prst="rect">
             <a:avLst/>
@@ -9290,7 +11200,9 @@
           </a:xfrm>
         </p:spPr>
         <p:txBody>
-          <a:bodyPr/>
+          <a:bodyPr>
+            <a:normAutofit/>
+          </a:bodyPr>
           <a:lstStyle/>
           <a:p>
             <a:pPr marL="0" indent="0">
@@ -9300,24 +11212,6 @@
               <a:rPr lang="it-IT" dirty="0"/>
               <a:t>Trovare i k vicini di ogni punto</a:t>
             </a:r>
-          </a:p>
-          <a:p>
-            <a:pPr marL="0" indent="0">
-              <a:buNone/>
-            </a:pPr>
-            <a:br>
-              <a:rPr lang="it-IT" dirty="0"/>
-            </a:br>
-            <a:r>
-              <a:rPr lang="it-IT" dirty="0"/>
-              <a:t> </a:t>
-            </a:r>
-          </a:p>
-          <a:p>
-            <a:endParaRPr lang="it-IT" dirty="0"/>
-          </a:p>
-          <a:p>
-            <a:endParaRPr lang="it-IT" dirty="0"/>
           </a:p>
         </p:txBody>
       </p:sp>
@@ -9421,10 +11315,10 @@
       </p:pic>
       <p:pic>
         <p:nvPicPr>
-          <p:cNvPr id="11" name="Immagine 10">
-            <a:extLst>
-              <a:ext uri="{FF2B5EF4-FFF2-40B4-BE49-F238E27FC236}">
-                <a16:creationId xmlns:a16="http://schemas.microsoft.com/office/drawing/2014/main" id="{C351EAFA-0EBD-4684-B77B-323D84AE26EF}"/>
+          <p:cNvPr id="12" name="Immagine 11">
+            <a:extLst>
+              <a:ext uri="{FF2B5EF4-FFF2-40B4-BE49-F238E27FC236}">
+                <a16:creationId xmlns:a16="http://schemas.microsoft.com/office/drawing/2014/main" id="{1FC25EE0-4DFD-4CC8-AB1A-98C9CEFE5486}"/>
               </a:ext>
             </a:extLst>
           </p:cNvPr>
@@ -9434,15 +11328,26 @@
           <p:nvPr/>
         </p:nvPicPr>
         <p:blipFill>
-          <a:blip r:embed="rId4"/>
+          <a:blip r:embed="rId4">
+            <a:clrChange>
+              <a:clrFrom>
+                <a:srgbClr val="FFFFFF"/>
+              </a:clrFrom>
+              <a:clrTo>
+                <a:srgbClr val="FFFFFF">
+                  <a:alpha val="0"/>
+                </a:srgbClr>
+              </a:clrTo>
+            </a:clrChange>
+          </a:blip>
           <a:stretch>
             <a:fillRect/>
           </a:stretch>
         </p:blipFill>
         <p:spPr>
           <a:xfrm>
-            <a:off x="3938286" y="3566142"/>
-            <a:ext cx="4315427" cy="876422"/>
+            <a:off x="1426167" y="3347937"/>
+            <a:ext cx="2953162" cy="1438476"/>
           </a:xfrm>
           <a:prstGeom prst="rect">
             <a:avLst/>
@@ -9451,10 +11356,10 @@
       </p:pic>
       <p:pic>
         <p:nvPicPr>
-          <p:cNvPr id="7" name="Immagine 6">
-            <a:extLst>
-              <a:ext uri="{FF2B5EF4-FFF2-40B4-BE49-F238E27FC236}">
-                <a16:creationId xmlns:a16="http://schemas.microsoft.com/office/drawing/2014/main" id="{1565B051-ED70-417E-849A-05CD0619D447}"/>
+          <p:cNvPr id="16" name="Immagine 15">
+            <a:extLst>
+              <a:ext uri="{FF2B5EF4-FFF2-40B4-BE49-F238E27FC236}">
+                <a16:creationId xmlns:a16="http://schemas.microsoft.com/office/drawing/2014/main" id="{616CC733-365C-496D-8761-36F640A60AEC}"/>
               </a:ext>
             </a:extLst>
           </p:cNvPr>
@@ -9464,15 +11369,26 @@
           <p:nvPr/>
         </p:nvPicPr>
         <p:blipFill>
-          <a:blip r:embed="rId5"/>
+          <a:blip r:embed="rId5">
+            <a:clrChange>
+              <a:clrFrom>
+                <a:srgbClr val="FFFFFF"/>
+              </a:clrFrom>
+              <a:clrTo>
+                <a:srgbClr val="FFFFFF">
+                  <a:alpha val="0"/>
+                </a:srgbClr>
+              </a:clrTo>
+            </a:clrChange>
+          </a:blip>
           <a:stretch>
             <a:fillRect/>
           </a:stretch>
         </p:blipFill>
         <p:spPr>
           <a:xfrm>
-            <a:off x="3490569" y="2933631"/>
-            <a:ext cx="4925112" cy="495369"/>
+            <a:off x="4379329" y="3414622"/>
+            <a:ext cx="3801005" cy="1371791"/>
           </a:xfrm>
           <a:prstGeom prst="rect">
             <a:avLst/>
@@ -9566,6 +11482,14 @@
               </a:rPr>
               <a:t>Reconstruction</a:t>
             </a:r>
+            <a:r>
+              <a:rPr lang="it-IT" sz="4400" dirty="0">
+                <a:solidFill>
+                  <a:srgbClr val="3F568A"/>
+                </a:solidFill>
+              </a:rPr>
+              <a:t> (1)</a:t>
+            </a:r>
             <a:endParaRPr lang="it-IT" dirty="0">
               <a:solidFill>
                 <a:srgbClr val="3F568A"/>
@@ -9592,8 +11516,8 @@
         </p:nvSpPr>
         <p:spPr>
           <a:xfrm>
-            <a:off x="838200" y="2141537"/>
-            <a:ext cx="10515600" cy="3505119"/>
+            <a:off x="838200" y="1690689"/>
+            <a:ext cx="10515600" cy="3955968"/>
           </a:xfrm>
         </p:spPr>
         <p:txBody>
@@ -9717,10 +11641,10 @@
       </p:pic>
       <p:pic>
         <p:nvPicPr>
-          <p:cNvPr id="10" name="Immagine 9">
-            <a:extLst>
-              <a:ext uri="{FF2B5EF4-FFF2-40B4-BE49-F238E27FC236}">
-                <a16:creationId xmlns:a16="http://schemas.microsoft.com/office/drawing/2014/main" id="{BBC39D22-6EED-4B95-A16B-DDFF63DE973E}"/>
+          <p:cNvPr id="24" name="Immagine 23">
+            <a:extLst>
+              <a:ext uri="{FF2B5EF4-FFF2-40B4-BE49-F238E27FC236}">
+                <a16:creationId xmlns:a16="http://schemas.microsoft.com/office/drawing/2014/main" id="{1F1D2DFA-3B36-4D65-9803-7B8D3AE8106B}"/>
               </a:ext>
             </a:extLst>
           </p:cNvPr>
@@ -9730,15 +11654,26 @@
           <p:nvPr/>
         </p:nvPicPr>
         <p:blipFill>
-          <a:blip r:embed="rId4"/>
+          <a:blip r:embed="rId4">
+            <a:clrChange>
+              <a:clrFrom>
+                <a:srgbClr val="FFFFFF"/>
+              </a:clrFrom>
+              <a:clrTo>
+                <a:srgbClr val="FFFFFF">
+                  <a:alpha val="0"/>
+                </a:srgbClr>
+              </a:clrTo>
+            </a:clrChange>
+          </a:blip>
           <a:stretch>
             <a:fillRect/>
           </a:stretch>
         </p:blipFill>
         <p:spPr>
           <a:xfrm>
-            <a:off x="1319020" y="2833562"/>
-            <a:ext cx="2753109" cy="1276528"/>
+            <a:off x="5162414" y="2506584"/>
+            <a:ext cx="1867161" cy="704948"/>
           </a:xfrm>
           <a:prstGeom prst="rect">
             <a:avLst/>
@@ -9747,10 +11682,10 @@
       </p:pic>
       <p:pic>
         <p:nvPicPr>
-          <p:cNvPr id="13" name="Immagine 12">
-            <a:extLst>
-              <a:ext uri="{FF2B5EF4-FFF2-40B4-BE49-F238E27FC236}">
-                <a16:creationId xmlns:a16="http://schemas.microsoft.com/office/drawing/2014/main" id="{39C08512-06E6-4141-83E9-C7AD8BBBE5DF}"/>
+          <p:cNvPr id="26" name="Immagine 25">
+            <a:extLst>
+              <a:ext uri="{FF2B5EF4-FFF2-40B4-BE49-F238E27FC236}">
+                <a16:creationId xmlns:a16="http://schemas.microsoft.com/office/drawing/2014/main" id="{782AC7CF-51F2-4983-9BC5-5C817F934B7A}"/>
               </a:ext>
             </a:extLst>
           </p:cNvPr>
@@ -9760,15 +11695,26 @@
           <p:nvPr/>
         </p:nvPicPr>
         <p:blipFill>
-          <a:blip r:embed="rId5"/>
+          <a:blip r:embed="rId5">
+            <a:clrChange>
+              <a:clrFrom>
+                <a:srgbClr val="FFFFFF"/>
+              </a:clrFrom>
+              <a:clrTo>
+                <a:srgbClr val="FFFFFF">
+                  <a:alpha val="0"/>
+                </a:srgbClr>
+              </a:clrTo>
+            </a:clrChange>
+          </a:blip>
           <a:stretch>
             <a:fillRect/>
           </a:stretch>
         </p:blipFill>
         <p:spPr>
           <a:xfrm>
-            <a:off x="988017" y="3922675"/>
-            <a:ext cx="4801270" cy="1219370"/>
+            <a:off x="4490809" y="3292383"/>
+            <a:ext cx="3210373" cy="752580"/>
           </a:xfrm>
           <a:prstGeom prst="rect">
             <a:avLst/>
@@ -9777,10 +11723,10 @@
       </p:pic>
       <p:pic>
         <p:nvPicPr>
-          <p:cNvPr id="15" name="Immagine 14">
-            <a:extLst>
-              <a:ext uri="{FF2B5EF4-FFF2-40B4-BE49-F238E27FC236}">
-                <a16:creationId xmlns:a16="http://schemas.microsoft.com/office/drawing/2014/main" id="{664878D5-3BB1-4425-B2D6-499EFF324AD0}"/>
+          <p:cNvPr id="28" name="Immagine 27">
+            <a:extLst>
+              <a:ext uri="{FF2B5EF4-FFF2-40B4-BE49-F238E27FC236}">
+                <a16:creationId xmlns:a16="http://schemas.microsoft.com/office/drawing/2014/main" id="{2A68F2EA-7BB6-4520-AA11-36BF3B173CCF}"/>
               </a:ext>
             </a:extLst>
           </p:cNvPr>
@@ -9790,15 +11736,26 @@
           <p:nvPr/>
         </p:nvPicPr>
         <p:blipFill>
-          <a:blip r:embed="rId6"/>
+          <a:blip r:embed="rId6">
+            <a:clrChange>
+              <a:clrFrom>
+                <a:srgbClr val="FFFFFF"/>
+              </a:clrFrom>
+              <a:clrTo>
+                <a:srgbClr val="FFFFFF">
+                  <a:alpha val="0"/>
+                </a:srgbClr>
+              </a:clrTo>
+            </a:clrChange>
+          </a:blip>
           <a:stretch>
             <a:fillRect/>
           </a:stretch>
         </p:blipFill>
         <p:spPr>
           <a:xfrm>
-            <a:off x="6019317" y="2490614"/>
-            <a:ext cx="4201111" cy="1962424"/>
+            <a:off x="4876626" y="4125814"/>
+            <a:ext cx="2438740" cy="1200318"/>
           </a:xfrm>
           <a:prstGeom prst="rect">
             <a:avLst/>
@@ -10598,6 +12555,15 @@
 </file>
 
 <file path=customXml/item2.xml><?xml version="1.0" encoding="utf-8"?>
+<?mso-contentType ?>
+<FormTemplates xmlns="http://schemas.microsoft.com/sharepoint/v3/contenttype/forms">
+  <Display>DocumentLibraryForm</Display>
+  <Edit>DocumentLibraryForm</Edit>
+  <New>DocumentLibraryForm</New>
+</FormTemplates>
+</file>
+
+<file path=customXml/item3.xml><?xml version="1.0" encoding="utf-8"?>
 <ct:contentTypeSchema xmlns:ct="http://schemas.microsoft.com/office/2006/metadata/contentType" xmlns:ma="http://schemas.microsoft.com/office/2006/metadata/properties/metaAttributes" ct:_="" ma:_="" ma:contentTypeName="Document" ma:contentTypeID="0x01010079F111ED35F8CC479449609E8A0923A6" ma:contentTypeVersion="12" ma:contentTypeDescription="Create a new document." ma:contentTypeScope="" ma:versionID="a410dd7f93c95333ffa1b60ed6adedd1">
   <xsd:schema xmlns:xsd="http://www.w3.org/2001/XMLSchema" xmlns:xs="http://www.w3.org/2001/XMLSchema" xmlns:p="http://schemas.microsoft.com/office/2006/metadata/properties" xmlns:ns2="71af3243-3dd4-4a8d-8c0d-dd76da1f02a5" xmlns:ns3="16c05727-aa75-4e4a-9b5f-8a80a1165891" targetNamespace="http://schemas.microsoft.com/office/2006/metadata/properties" ma:root="true" ma:fieldsID="a936d9baba76aa3866493feff160faab" ns2:_="" ns3:_="">
     <xsd:import namespace="71af3243-3dd4-4a8d-8c0d-dd76da1f02a5"/>
@@ -10818,15 +12784,6 @@
 </ct:contentTypeSchema>
 </file>
 
-<file path=customXml/item3.xml><?xml version="1.0" encoding="utf-8"?>
-<?mso-contentType ?>
-<FormTemplates xmlns="http://schemas.microsoft.com/sharepoint/v3/contenttype/forms">
-  <Display>DocumentLibraryForm</Display>
-  <Edit>DocumentLibraryForm</Edit>
-  <New>DocumentLibraryForm</New>
-</FormTemplates>
-</file>
-
 <file path=customXml/itemProps1.xml><?xml version="1.0" encoding="utf-8"?>
 <ds:datastoreItem xmlns:ds="http://schemas.openxmlformats.org/officeDocument/2006/customXml" ds:itemID="{2C4C00F4-06E9-43E3-AD97-88A857CEFA82}">
   <ds:schemaRefs>
@@ -10838,6 +12795,14 @@
 </file>
 
 <file path=customXml/itemProps2.xml><?xml version="1.0" encoding="utf-8"?>
+<ds:datastoreItem xmlns:ds="http://schemas.openxmlformats.org/officeDocument/2006/customXml" ds:itemID="{64B270AB-C138-415C-897E-3C24487DECF1}">
+  <ds:schemaRefs>
+    <ds:schemaRef ds:uri="http://schemas.microsoft.com/sharepoint/v3/contenttype/forms"/>
+  </ds:schemaRefs>
+</ds:datastoreItem>
+</file>
+
+<file path=customXml/itemProps3.xml><?xml version="1.0" encoding="utf-8"?>
 <ds:datastoreItem xmlns:ds="http://schemas.openxmlformats.org/officeDocument/2006/customXml" ds:itemID="{0585E981-8C91-4205-A0C3-C991F42B4C9E}">
   <ds:schemaRefs>
     <ds:schemaRef ds:uri="http://schemas.microsoft.com/office/2006/metadata/contentType"/>
@@ -10854,12 +12819,4 @@
     <ds:schemaRef ds:uri="http://schemas.microsoft.com/internal/obd"/>
   </ds:schemaRefs>
 </ds:datastoreItem>
-</file>
-
-<file path=customXml/itemProps3.xml><?xml version="1.0" encoding="utf-8"?>
-<ds:datastoreItem xmlns:ds="http://schemas.openxmlformats.org/officeDocument/2006/customXml" ds:itemID="{64B270AB-C138-415C-897E-3C24487DECF1}">
-  <ds:schemaRefs>
-    <ds:schemaRef ds:uri="http://schemas.microsoft.com/sharepoint/v3/contenttype/forms"/>
-  </ds:schemaRefs>
-</ds:datastoreItem>
 </file>
</xml_diff>